<commit_message>
Seperated corrupted and last working Presentation
</commit_message>
<xml_diff>
--- a/Presentation Slides/Second Midterm (11-01-2022)/Midterm 11-01-2022.pptx
+++ b/Presentation Slides/Second Midterm (11-01-2022)/Midterm 11-01-2022.pptx
@@ -4,38 +4,37 @@
   <p:sldMasterIdLst>
     <p:sldMasterId id="2147483648" r:id="rId1"/>
     <p:sldMasterId id="2147483661" r:id="rId2"/>
-    <p:sldMasterId id="2147483674" r:id="rId3"/>
   </p:sldMasterIdLst>
   <p:notesMasterIdLst>
-    <p:notesMasterId r:id="rId30"/>
+    <p:notesMasterId r:id="rId29"/>
   </p:notesMasterIdLst>
   <p:sldIdLst>
-    <p:sldId id="256" r:id="rId4"/>
-    <p:sldId id="257" r:id="rId5"/>
-    <p:sldId id="272" r:id="rId6"/>
-    <p:sldId id="266" r:id="rId7"/>
-    <p:sldId id="268" r:id="rId8"/>
-    <p:sldId id="274" r:id="rId9"/>
-    <p:sldId id="276" r:id="rId10"/>
-    <p:sldId id="263" r:id="rId11"/>
-    <p:sldId id="284" r:id="rId12"/>
-    <p:sldId id="265" r:id="rId13"/>
-    <p:sldId id="285" r:id="rId14"/>
-    <p:sldId id="286" r:id="rId15"/>
-    <p:sldId id="287" r:id="rId16"/>
-    <p:sldId id="269" r:id="rId17"/>
-    <p:sldId id="270" r:id="rId18"/>
-    <p:sldId id="271" r:id="rId19"/>
-    <p:sldId id="288" r:id="rId20"/>
-    <p:sldId id="280" r:id="rId21"/>
-    <p:sldId id="289" r:id="rId22"/>
-    <p:sldId id="283" r:id="rId23"/>
-    <p:sldId id="290" r:id="rId24"/>
-    <p:sldId id="275" r:id="rId25"/>
-    <p:sldId id="282" r:id="rId26"/>
-    <p:sldId id="291" r:id="rId27"/>
-    <p:sldId id="277" r:id="rId28"/>
-    <p:sldId id="264" r:id="rId29"/>
+    <p:sldId id="256" r:id="rId3"/>
+    <p:sldId id="257" r:id="rId4"/>
+    <p:sldId id="272" r:id="rId5"/>
+    <p:sldId id="266" r:id="rId6"/>
+    <p:sldId id="268" r:id="rId7"/>
+    <p:sldId id="274" r:id="rId8"/>
+    <p:sldId id="276" r:id="rId9"/>
+    <p:sldId id="263" r:id="rId10"/>
+    <p:sldId id="284" r:id="rId11"/>
+    <p:sldId id="265" r:id="rId12"/>
+    <p:sldId id="285" r:id="rId13"/>
+    <p:sldId id="286" r:id="rId14"/>
+    <p:sldId id="287" r:id="rId15"/>
+    <p:sldId id="269" r:id="rId16"/>
+    <p:sldId id="270" r:id="rId17"/>
+    <p:sldId id="271" r:id="rId18"/>
+    <p:sldId id="288" r:id="rId19"/>
+    <p:sldId id="280" r:id="rId20"/>
+    <p:sldId id="289" r:id="rId21"/>
+    <p:sldId id="283" r:id="rId22"/>
+    <p:sldId id="290" r:id="rId23"/>
+    <p:sldId id="275" r:id="rId24"/>
+    <p:sldId id="282" r:id="rId25"/>
+    <p:sldId id="291" r:id="rId26"/>
+    <p:sldId id="277" r:id="rId27"/>
+    <p:sldId id="292" r:id="rId28"/>
   </p:sldIdLst>
   <p:sldSz cx="9144000" cy="6858000" type="screen4x3"/>
   <p:notesSz cx="7559675" cy="10691813"/>
@@ -9033,384 +9032,6 @@
 </p:sldLayout>
 </file>
 
-<file path=ppt/slideLayouts/slideLayout25.xml><?xml version="1.0" encoding="utf-8"?>
-<p:sldLayout xmlns:a="http://schemas.openxmlformats.org/drawingml/2006/main" xmlns:r="http://schemas.openxmlformats.org/officeDocument/2006/relationships" xmlns:p="http://schemas.openxmlformats.org/presentationml/2006/main" type="blank" preserve="1">
-  <p:cSld name="Blank Slide">
-    <p:spTree>
-      <p:nvGrpSpPr>
-        <p:cNvPr id="1" name=""/>
-        <p:cNvGrpSpPr/>
-        <p:nvPr/>
-      </p:nvGrpSpPr>
-      <p:grpSpPr>
-        <a:xfrm>
-          <a:off x="0" y="0"/>
-          <a:ext cx="0" cy="0"/>
-          <a:chOff x="0" y="0"/>
-          <a:chExt cx="0" cy="0"/>
-        </a:xfrm>
-      </p:grpSpPr>
-    </p:spTree>
-  </p:cSld>
-  <p:clrMapOvr>
-    <a:masterClrMapping/>
-  </p:clrMapOvr>
-</p:sldLayout>
-</file>
-
-<file path=ppt/slideLayouts/slideLayout26.xml><?xml version="1.0" encoding="utf-8"?>
-<p:sldLayout xmlns:a="http://schemas.openxmlformats.org/drawingml/2006/main" xmlns:r="http://schemas.openxmlformats.org/officeDocument/2006/relationships" xmlns:p="http://schemas.openxmlformats.org/presentationml/2006/main" type="tx" preserve="1">
-  <p:cSld name="Title Slide">
-    <p:spTree>
-      <p:nvGrpSpPr>
-        <p:cNvPr id="1" name=""/>
-        <p:cNvGrpSpPr/>
-        <p:nvPr/>
-      </p:nvGrpSpPr>
-      <p:grpSpPr>
-        <a:xfrm>
-          <a:off x="0" y="0"/>
-          <a:ext cx="0" cy="0"/>
-          <a:chOff x="0" y="0"/>
-          <a:chExt cx="0" cy="0"/>
-        </a:xfrm>
-      </p:grpSpPr>
-      <p:sp>
-        <p:nvSpPr>
-          <p:cNvPr id="91" name="PlaceHolder 1"/>
-          <p:cNvSpPr>
-            <a:spLocks noGrp="1"/>
-          </p:cNvSpPr>
-          <p:nvPr>
-            <p:ph type="title"/>
-          </p:nvPr>
-        </p:nvSpPr>
-        <p:spPr>
-          <a:xfrm>
-            <a:off x="822960" y="1385640"/>
-            <a:ext cx="7543080" cy="4147200"/>
-          </a:xfrm>
-          <a:prstGeom prst="rect">
-            <a:avLst/>
-          </a:prstGeom>
-        </p:spPr>
-        <p:txBody>
-          <a:bodyPr lIns="0" tIns="0" rIns="0" bIns="0" anchor="ctr">
-            <a:noAutofit/>
-          </a:bodyPr>
-          <a:lstStyle/>
-          <a:p>
-            <a:pPr algn="ctr"/>
-            <a:endParaRPr lang="de-AT" sz="4400" b="0" strike="noStrike" spc="-1">
-              <a:latin typeface="Arial"/>
-            </a:endParaRPr>
-          </a:p>
-        </p:txBody>
-      </p:sp>
-      <p:sp>
-        <p:nvSpPr>
-          <p:cNvPr id="92" name="PlaceHolder 2"/>
-          <p:cNvSpPr>
-            <a:spLocks noGrp="1"/>
-          </p:cNvSpPr>
-          <p:nvPr>
-            <p:ph type="subTitle"/>
-          </p:nvPr>
-        </p:nvSpPr>
-        <p:spPr>
-          <a:xfrm>
-            <a:off x="457200" y="1604520"/>
-            <a:ext cx="8229240" cy="3977280"/>
-          </a:xfrm>
-          <a:prstGeom prst="rect">
-            <a:avLst/>
-          </a:prstGeom>
-        </p:spPr>
-        <p:txBody>
-          <a:bodyPr lIns="0" tIns="0" rIns="0" bIns="0" anchor="ctr">
-            <a:noAutofit/>
-          </a:bodyPr>
-          <a:lstStyle/>
-          <a:p>
-            <a:pPr algn="ctr"/>
-            <a:endParaRPr lang="de-AT" sz="3200" b="0" strike="noStrike" spc="-1">
-              <a:latin typeface="Arial"/>
-            </a:endParaRPr>
-          </a:p>
-        </p:txBody>
-      </p:sp>
-    </p:spTree>
-  </p:cSld>
-  <p:clrMapOvr>
-    <a:masterClrMapping/>
-  </p:clrMapOvr>
-</p:sldLayout>
-</file>
-
-<file path=ppt/slideLayouts/slideLayout27.xml><?xml version="1.0" encoding="utf-8"?>
-<p:sldLayout xmlns:a="http://schemas.openxmlformats.org/drawingml/2006/main" xmlns:r="http://schemas.openxmlformats.org/officeDocument/2006/relationships" xmlns:p="http://schemas.openxmlformats.org/presentationml/2006/main" type="obj" preserve="1">
-  <p:cSld name="Title, Content">
-    <p:spTree>
-      <p:nvGrpSpPr>
-        <p:cNvPr id="1" name=""/>
-        <p:cNvGrpSpPr/>
-        <p:nvPr/>
-      </p:nvGrpSpPr>
-      <p:grpSpPr>
-        <a:xfrm>
-          <a:off x="0" y="0"/>
-          <a:ext cx="0" cy="0"/>
-          <a:chOff x="0" y="0"/>
-          <a:chExt cx="0" cy="0"/>
-        </a:xfrm>
-      </p:grpSpPr>
-      <p:sp>
-        <p:nvSpPr>
-          <p:cNvPr id="93" name="PlaceHolder 1"/>
-          <p:cNvSpPr>
-            <a:spLocks noGrp="1"/>
-          </p:cNvSpPr>
-          <p:nvPr>
-            <p:ph type="title"/>
-          </p:nvPr>
-        </p:nvSpPr>
-        <p:spPr>
-          <a:xfrm>
-            <a:off x="822960" y="1385640"/>
-            <a:ext cx="7543080" cy="4147200"/>
-          </a:xfrm>
-          <a:prstGeom prst="rect">
-            <a:avLst/>
-          </a:prstGeom>
-        </p:spPr>
-        <p:txBody>
-          <a:bodyPr lIns="0" tIns="0" rIns="0" bIns="0" anchor="ctr">
-            <a:noAutofit/>
-          </a:bodyPr>
-          <a:lstStyle/>
-          <a:p>
-            <a:pPr algn="ctr"/>
-            <a:endParaRPr lang="de-AT" sz="4400" b="0" strike="noStrike" spc="-1">
-              <a:latin typeface="Arial"/>
-            </a:endParaRPr>
-          </a:p>
-        </p:txBody>
-      </p:sp>
-      <p:sp>
-        <p:nvSpPr>
-          <p:cNvPr id="94" name="PlaceHolder 2"/>
-          <p:cNvSpPr>
-            <a:spLocks noGrp="1"/>
-          </p:cNvSpPr>
-          <p:nvPr>
-            <p:ph type="body"/>
-          </p:nvPr>
-        </p:nvSpPr>
-        <p:spPr>
-          <a:xfrm>
-            <a:off x="457200" y="1604520"/>
-            <a:ext cx="8229240" cy="3977280"/>
-          </a:xfrm>
-          <a:prstGeom prst="rect">
-            <a:avLst/>
-          </a:prstGeom>
-        </p:spPr>
-        <p:txBody>
-          <a:bodyPr lIns="0" tIns="0" rIns="0" bIns="0">
-            <a:normAutofit/>
-          </a:bodyPr>
-          <a:lstStyle/>
-          <a:p>
-            <a:endParaRPr lang="de-AT" sz="3200" b="0" strike="noStrike" spc="-1">
-              <a:latin typeface="Arial"/>
-            </a:endParaRPr>
-          </a:p>
-        </p:txBody>
-      </p:sp>
-    </p:spTree>
-  </p:cSld>
-  <p:clrMapOvr>
-    <a:masterClrMapping/>
-  </p:clrMapOvr>
-</p:sldLayout>
-</file>
-
-<file path=ppt/slideLayouts/slideLayout28.xml><?xml version="1.0" encoding="utf-8"?>
-<p:sldLayout xmlns:a="http://schemas.openxmlformats.org/drawingml/2006/main" xmlns:r="http://schemas.openxmlformats.org/officeDocument/2006/relationships" xmlns:p="http://schemas.openxmlformats.org/presentationml/2006/main" type="twoObj" preserve="1">
-  <p:cSld name="Title, 2 Content">
-    <p:spTree>
-      <p:nvGrpSpPr>
-        <p:cNvPr id="1" name=""/>
-        <p:cNvGrpSpPr/>
-        <p:nvPr/>
-      </p:nvGrpSpPr>
-      <p:grpSpPr>
-        <a:xfrm>
-          <a:off x="0" y="0"/>
-          <a:ext cx="0" cy="0"/>
-          <a:chOff x="0" y="0"/>
-          <a:chExt cx="0" cy="0"/>
-        </a:xfrm>
-      </p:grpSpPr>
-      <p:sp>
-        <p:nvSpPr>
-          <p:cNvPr id="95" name="PlaceHolder 1"/>
-          <p:cNvSpPr>
-            <a:spLocks noGrp="1"/>
-          </p:cNvSpPr>
-          <p:nvPr>
-            <p:ph type="title"/>
-          </p:nvPr>
-        </p:nvSpPr>
-        <p:spPr>
-          <a:xfrm>
-            <a:off x="822960" y="1385640"/>
-            <a:ext cx="7543080" cy="4147200"/>
-          </a:xfrm>
-          <a:prstGeom prst="rect">
-            <a:avLst/>
-          </a:prstGeom>
-        </p:spPr>
-        <p:txBody>
-          <a:bodyPr lIns="0" tIns="0" rIns="0" bIns="0" anchor="ctr">
-            <a:noAutofit/>
-          </a:bodyPr>
-          <a:lstStyle/>
-          <a:p>
-            <a:pPr algn="ctr"/>
-            <a:endParaRPr lang="de-AT" sz="4400" b="0" strike="noStrike" spc="-1">
-              <a:latin typeface="Arial"/>
-            </a:endParaRPr>
-          </a:p>
-        </p:txBody>
-      </p:sp>
-      <p:sp>
-        <p:nvSpPr>
-          <p:cNvPr id="96" name="PlaceHolder 2"/>
-          <p:cNvSpPr>
-            <a:spLocks noGrp="1"/>
-          </p:cNvSpPr>
-          <p:nvPr>
-            <p:ph type="body"/>
-          </p:nvPr>
-        </p:nvSpPr>
-        <p:spPr>
-          <a:xfrm>
-            <a:off x="457200" y="1604520"/>
-            <a:ext cx="4015800" cy="3977280"/>
-          </a:xfrm>
-          <a:prstGeom prst="rect">
-            <a:avLst/>
-          </a:prstGeom>
-        </p:spPr>
-        <p:txBody>
-          <a:bodyPr lIns="0" tIns="0" rIns="0" bIns="0">
-            <a:normAutofit/>
-          </a:bodyPr>
-          <a:lstStyle/>
-          <a:p>
-            <a:endParaRPr lang="de-AT" sz="3200" b="0" strike="noStrike" spc="-1">
-              <a:latin typeface="Arial"/>
-            </a:endParaRPr>
-          </a:p>
-        </p:txBody>
-      </p:sp>
-      <p:sp>
-        <p:nvSpPr>
-          <p:cNvPr id="97" name="PlaceHolder 3"/>
-          <p:cNvSpPr>
-            <a:spLocks noGrp="1"/>
-          </p:cNvSpPr>
-          <p:nvPr>
-            <p:ph type="body"/>
-          </p:nvPr>
-        </p:nvSpPr>
-        <p:spPr>
-          <a:xfrm>
-            <a:off x="4674240" y="1604520"/>
-            <a:ext cx="4015800" cy="3977280"/>
-          </a:xfrm>
-          <a:prstGeom prst="rect">
-            <a:avLst/>
-          </a:prstGeom>
-        </p:spPr>
-        <p:txBody>
-          <a:bodyPr lIns="0" tIns="0" rIns="0" bIns="0">
-            <a:normAutofit/>
-          </a:bodyPr>
-          <a:lstStyle/>
-          <a:p>
-            <a:endParaRPr lang="de-AT" sz="3200" b="0" strike="noStrike" spc="-1">
-              <a:latin typeface="Arial"/>
-            </a:endParaRPr>
-          </a:p>
-        </p:txBody>
-      </p:sp>
-    </p:spTree>
-  </p:cSld>
-  <p:clrMapOvr>
-    <a:masterClrMapping/>
-  </p:clrMapOvr>
-</p:sldLayout>
-</file>
-
-<file path=ppt/slideLayouts/slideLayout29.xml><?xml version="1.0" encoding="utf-8"?>
-<p:sldLayout xmlns:a="http://schemas.openxmlformats.org/drawingml/2006/main" xmlns:r="http://schemas.openxmlformats.org/officeDocument/2006/relationships" xmlns:p="http://schemas.openxmlformats.org/presentationml/2006/main" type="titleOnly" preserve="1">
-  <p:cSld name="Title Only">
-    <p:spTree>
-      <p:nvGrpSpPr>
-        <p:cNvPr id="1" name=""/>
-        <p:cNvGrpSpPr/>
-        <p:nvPr/>
-      </p:nvGrpSpPr>
-      <p:grpSpPr>
-        <a:xfrm>
-          <a:off x="0" y="0"/>
-          <a:ext cx="0" cy="0"/>
-          <a:chOff x="0" y="0"/>
-          <a:chExt cx="0" cy="0"/>
-        </a:xfrm>
-      </p:grpSpPr>
-      <p:sp>
-        <p:nvSpPr>
-          <p:cNvPr id="98" name="PlaceHolder 1"/>
-          <p:cNvSpPr>
-            <a:spLocks noGrp="1"/>
-          </p:cNvSpPr>
-          <p:nvPr>
-            <p:ph type="title"/>
-          </p:nvPr>
-        </p:nvSpPr>
-        <p:spPr>
-          <a:xfrm>
-            <a:off x="822960" y="1385640"/>
-            <a:ext cx="7543080" cy="4147200"/>
-          </a:xfrm>
-          <a:prstGeom prst="rect">
-            <a:avLst/>
-          </a:prstGeom>
-        </p:spPr>
-        <p:txBody>
-          <a:bodyPr lIns="0" tIns="0" rIns="0" bIns="0" anchor="ctr">
-            <a:noAutofit/>
-          </a:bodyPr>
-          <a:lstStyle/>
-          <a:p>
-            <a:pPr algn="ctr"/>
-            <a:endParaRPr lang="de-AT" sz="4400" b="0" strike="noStrike" spc="-1">
-              <a:latin typeface="Arial"/>
-            </a:endParaRPr>
-          </a:p>
-        </p:txBody>
-      </p:sp>
-    </p:spTree>
-  </p:cSld>
-  <p:clrMapOvr>
-    <a:masterClrMapping/>
-  </p:clrMapOvr>
-</p:sldLayout>
-</file>
-
 <file path=ppt/slideLayouts/slideLayout3.xml><?xml version="1.0" encoding="utf-8"?>
 <p:sldLayout xmlns:a="http://schemas.openxmlformats.org/drawingml/2006/main" xmlns:r="http://schemas.openxmlformats.org/officeDocument/2006/relationships" xmlns:p="http://schemas.openxmlformats.org/presentationml/2006/main" type="obj" preserve="1">
   <p:cSld name="Title, Content">
@@ -9474,1056 +9095,6 @@
           <a:xfrm>
             <a:off x="457200" y="1604520"/>
             <a:ext cx="8229240" cy="3977280"/>
-          </a:xfrm>
-          <a:prstGeom prst="rect">
-            <a:avLst/>
-          </a:prstGeom>
-        </p:spPr>
-        <p:txBody>
-          <a:bodyPr lIns="0" tIns="0" rIns="0" bIns="0">
-            <a:normAutofit/>
-          </a:bodyPr>
-          <a:lstStyle/>
-          <a:p>
-            <a:endParaRPr lang="de-AT" sz="3200" b="0" strike="noStrike" spc="-1">
-              <a:latin typeface="Arial"/>
-            </a:endParaRPr>
-          </a:p>
-        </p:txBody>
-      </p:sp>
-    </p:spTree>
-  </p:cSld>
-  <p:clrMapOvr>
-    <a:masterClrMapping/>
-  </p:clrMapOvr>
-</p:sldLayout>
-</file>
-
-<file path=ppt/slideLayouts/slideLayout30.xml><?xml version="1.0" encoding="utf-8"?>
-<p:sldLayout xmlns:a="http://schemas.openxmlformats.org/drawingml/2006/main" xmlns:r="http://schemas.openxmlformats.org/officeDocument/2006/relationships" xmlns:p="http://schemas.openxmlformats.org/presentationml/2006/main" type="objOnly" preserve="1">
-  <p:cSld name="Centered Text">
-    <p:spTree>
-      <p:nvGrpSpPr>
-        <p:cNvPr id="1" name=""/>
-        <p:cNvGrpSpPr/>
-        <p:nvPr/>
-      </p:nvGrpSpPr>
-      <p:grpSpPr>
-        <a:xfrm>
-          <a:off x="0" y="0"/>
-          <a:ext cx="0" cy="0"/>
-          <a:chOff x="0" y="0"/>
-          <a:chExt cx="0" cy="0"/>
-        </a:xfrm>
-      </p:grpSpPr>
-      <p:sp>
-        <p:nvSpPr>
-          <p:cNvPr id="99" name="PlaceHolder 1"/>
-          <p:cNvSpPr>
-            <a:spLocks noGrp="1"/>
-          </p:cNvSpPr>
-          <p:nvPr>
-            <p:ph type="subTitle"/>
-          </p:nvPr>
-        </p:nvSpPr>
-        <p:spPr>
-          <a:xfrm>
-            <a:off x="822960" y="4140000"/>
-            <a:ext cx="7543080" cy="13716000"/>
-          </a:xfrm>
-          <a:prstGeom prst="rect">
-            <a:avLst/>
-          </a:prstGeom>
-        </p:spPr>
-        <p:txBody>
-          <a:bodyPr lIns="0" tIns="0" rIns="0" bIns="0" anchor="ctr">
-            <a:noAutofit/>
-          </a:bodyPr>
-          <a:lstStyle/>
-          <a:p>
-            <a:pPr algn="ctr"/>
-            <a:endParaRPr lang="de-AT" sz="3200" b="0" strike="noStrike" spc="-1">
-              <a:latin typeface="Arial"/>
-            </a:endParaRPr>
-          </a:p>
-        </p:txBody>
-      </p:sp>
-    </p:spTree>
-  </p:cSld>
-  <p:clrMapOvr>
-    <a:masterClrMapping/>
-  </p:clrMapOvr>
-</p:sldLayout>
-</file>
-
-<file path=ppt/slideLayouts/slideLayout31.xml><?xml version="1.0" encoding="utf-8"?>
-<p:sldLayout xmlns:a="http://schemas.openxmlformats.org/drawingml/2006/main" xmlns:r="http://schemas.openxmlformats.org/officeDocument/2006/relationships" xmlns:p="http://schemas.openxmlformats.org/presentationml/2006/main" type="twoObjAndObj" preserve="1">
-  <p:cSld name="Title, 2 Content and Content">
-    <p:spTree>
-      <p:nvGrpSpPr>
-        <p:cNvPr id="1" name=""/>
-        <p:cNvGrpSpPr/>
-        <p:nvPr/>
-      </p:nvGrpSpPr>
-      <p:grpSpPr>
-        <a:xfrm>
-          <a:off x="0" y="0"/>
-          <a:ext cx="0" cy="0"/>
-          <a:chOff x="0" y="0"/>
-          <a:chExt cx="0" cy="0"/>
-        </a:xfrm>
-      </p:grpSpPr>
-      <p:sp>
-        <p:nvSpPr>
-          <p:cNvPr id="100" name="PlaceHolder 1"/>
-          <p:cNvSpPr>
-            <a:spLocks noGrp="1"/>
-          </p:cNvSpPr>
-          <p:nvPr>
-            <p:ph type="title"/>
-          </p:nvPr>
-        </p:nvSpPr>
-        <p:spPr>
-          <a:xfrm>
-            <a:off x="822960" y="1385640"/>
-            <a:ext cx="7543080" cy="4147200"/>
-          </a:xfrm>
-          <a:prstGeom prst="rect">
-            <a:avLst/>
-          </a:prstGeom>
-        </p:spPr>
-        <p:txBody>
-          <a:bodyPr lIns="0" tIns="0" rIns="0" bIns="0" anchor="ctr">
-            <a:noAutofit/>
-          </a:bodyPr>
-          <a:lstStyle/>
-          <a:p>
-            <a:pPr algn="ctr"/>
-            <a:endParaRPr lang="de-AT" sz="4400" b="0" strike="noStrike" spc="-1">
-              <a:latin typeface="Arial"/>
-            </a:endParaRPr>
-          </a:p>
-        </p:txBody>
-      </p:sp>
-      <p:sp>
-        <p:nvSpPr>
-          <p:cNvPr id="101" name="PlaceHolder 2"/>
-          <p:cNvSpPr>
-            <a:spLocks noGrp="1"/>
-          </p:cNvSpPr>
-          <p:nvPr>
-            <p:ph type="body"/>
-          </p:nvPr>
-        </p:nvSpPr>
-        <p:spPr>
-          <a:xfrm>
-            <a:off x="457200" y="1604520"/>
-            <a:ext cx="4015800" cy="1896840"/>
-          </a:xfrm>
-          <a:prstGeom prst="rect">
-            <a:avLst/>
-          </a:prstGeom>
-        </p:spPr>
-        <p:txBody>
-          <a:bodyPr lIns="0" tIns="0" rIns="0" bIns="0">
-            <a:normAutofit/>
-          </a:bodyPr>
-          <a:lstStyle/>
-          <a:p>
-            <a:endParaRPr lang="de-AT" sz="3200" b="0" strike="noStrike" spc="-1">
-              <a:latin typeface="Arial"/>
-            </a:endParaRPr>
-          </a:p>
-        </p:txBody>
-      </p:sp>
-      <p:sp>
-        <p:nvSpPr>
-          <p:cNvPr id="102" name="PlaceHolder 3"/>
-          <p:cNvSpPr>
-            <a:spLocks noGrp="1"/>
-          </p:cNvSpPr>
-          <p:nvPr>
-            <p:ph type="body"/>
-          </p:nvPr>
-        </p:nvSpPr>
-        <p:spPr>
-          <a:xfrm>
-            <a:off x="4674240" y="1604520"/>
-            <a:ext cx="4015800" cy="3977280"/>
-          </a:xfrm>
-          <a:prstGeom prst="rect">
-            <a:avLst/>
-          </a:prstGeom>
-        </p:spPr>
-        <p:txBody>
-          <a:bodyPr lIns="0" tIns="0" rIns="0" bIns="0">
-            <a:normAutofit/>
-          </a:bodyPr>
-          <a:lstStyle/>
-          <a:p>
-            <a:endParaRPr lang="de-AT" sz="3200" b="0" strike="noStrike" spc="-1">
-              <a:latin typeface="Arial"/>
-            </a:endParaRPr>
-          </a:p>
-        </p:txBody>
-      </p:sp>
-      <p:sp>
-        <p:nvSpPr>
-          <p:cNvPr id="103" name="PlaceHolder 4"/>
-          <p:cNvSpPr>
-            <a:spLocks noGrp="1"/>
-          </p:cNvSpPr>
-          <p:nvPr>
-            <p:ph type="body"/>
-          </p:nvPr>
-        </p:nvSpPr>
-        <p:spPr>
-          <a:xfrm>
-            <a:off x="457200" y="3682080"/>
-            <a:ext cx="4015800" cy="1896840"/>
-          </a:xfrm>
-          <a:prstGeom prst="rect">
-            <a:avLst/>
-          </a:prstGeom>
-        </p:spPr>
-        <p:txBody>
-          <a:bodyPr lIns="0" tIns="0" rIns="0" bIns="0">
-            <a:normAutofit/>
-          </a:bodyPr>
-          <a:lstStyle/>
-          <a:p>
-            <a:endParaRPr lang="de-AT" sz="3200" b="0" strike="noStrike" spc="-1">
-              <a:latin typeface="Arial"/>
-            </a:endParaRPr>
-          </a:p>
-        </p:txBody>
-      </p:sp>
-    </p:spTree>
-  </p:cSld>
-  <p:clrMapOvr>
-    <a:masterClrMapping/>
-  </p:clrMapOvr>
-</p:sldLayout>
-</file>
-
-<file path=ppt/slideLayouts/slideLayout32.xml><?xml version="1.0" encoding="utf-8"?>
-<p:sldLayout xmlns:a="http://schemas.openxmlformats.org/drawingml/2006/main" xmlns:r="http://schemas.openxmlformats.org/officeDocument/2006/relationships" xmlns:p="http://schemas.openxmlformats.org/presentationml/2006/main" type="objAndTwoObj" preserve="1">
-  <p:cSld name="Title Content and 2 Content">
-    <p:spTree>
-      <p:nvGrpSpPr>
-        <p:cNvPr id="1" name=""/>
-        <p:cNvGrpSpPr/>
-        <p:nvPr/>
-      </p:nvGrpSpPr>
-      <p:grpSpPr>
-        <a:xfrm>
-          <a:off x="0" y="0"/>
-          <a:ext cx="0" cy="0"/>
-          <a:chOff x="0" y="0"/>
-          <a:chExt cx="0" cy="0"/>
-        </a:xfrm>
-      </p:grpSpPr>
-      <p:sp>
-        <p:nvSpPr>
-          <p:cNvPr id="104" name="PlaceHolder 1"/>
-          <p:cNvSpPr>
-            <a:spLocks noGrp="1"/>
-          </p:cNvSpPr>
-          <p:nvPr>
-            <p:ph type="title"/>
-          </p:nvPr>
-        </p:nvSpPr>
-        <p:spPr>
-          <a:xfrm>
-            <a:off x="822960" y="1385640"/>
-            <a:ext cx="7543080" cy="4147200"/>
-          </a:xfrm>
-          <a:prstGeom prst="rect">
-            <a:avLst/>
-          </a:prstGeom>
-        </p:spPr>
-        <p:txBody>
-          <a:bodyPr lIns="0" tIns="0" rIns="0" bIns="0" anchor="ctr">
-            <a:noAutofit/>
-          </a:bodyPr>
-          <a:lstStyle/>
-          <a:p>
-            <a:pPr algn="ctr"/>
-            <a:endParaRPr lang="de-AT" sz="4400" b="0" strike="noStrike" spc="-1">
-              <a:latin typeface="Arial"/>
-            </a:endParaRPr>
-          </a:p>
-        </p:txBody>
-      </p:sp>
-      <p:sp>
-        <p:nvSpPr>
-          <p:cNvPr id="105" name="PlaceHolder 2"/>
-          <p:cNvSpPr>
-            <a:spLocks noGrp="1"/>
-          </p:cNvSpPr>
-          <p:nvPr>
-            <p:ph type="body"/>
-          </p:nvPr>
-        </p:nvSpPr>
-        <p:spPr>
-          <a:xfrm>
-            <a:off x="457200" y="1604520"/>
-            <a:ext cx="4015800" cy="3977280"/>
-          </a:xfrm>
-          <a:prstGeom prst="rect">
-            <a:avLst/>
-          </a:prstGeom>
-        </p:spPr>
-        <p:txBody>
-          <a:bodyPr lIns="0" tIns="0" rIns="0" bIns="0">
-            <a:normAutofit/>
-          </a:bodyPr>
-          <a:lstStyle/>
-          <a:p>
-            <a:endParaRPr lang="de-AT" sz="3200" b="0" strike="noStrike" spc="-1">
-              <a:latin typeface="Arial"/>
-            </a:endParaRPr>
-          </a:p>
-        </p:txBody>
-      </p:sp>
-      <p:sp>
-        <p:nvSpPr>
-          <p:cNvPr id="106" name="PlaceHolder 3"/>
-          <p:cNvSpPr>
-            <a:spLocks noGrp="1"/>
-          </p:cNvSpPr>
-          <p:nvPr>
-            <p:ph type="body"/>
-          </p:nvPr>
-        </p:nvSpPr>
-        <p:spPr>
-          <a:xfrm>
-            <a:off x="4674240" y="1604520"/>
-            <a:ext cx="4015800" cy="1896840"/>
-          </a:xfrm>
-          <a:prstGeom prst="rect">
-            <a:avLst/>
-          </a:prstGeom>
-        </p:spPr>
-        <p:txBody>
-          <a:bodyPr lIns="0" tIns="0" rIns="0" bIns="0">
-            <a:normAutofit/>
-          </a:bodyPr>
-          <a:lstStyle/>
-          <a:p>
-            <a:endParaRPr lang="de-AT" sz="3200" b="0" strike="noStrike" spc="-1">
-              <a:latin typeface="Arial"/>
-            </a:endParaRPr>
-          </a:p>
-        </p:txBody>
-      </p:sp>
-      <p:sp>
-        <p:nvSpPr>
-          <p:cNvPr id="107" name="PlaceHolder 4"/>
-          <p:cNvSpPr>
-            <a:spLocks noGrp="1"/>
-          </p:cNvSpPr>
-          <p:nvPr>
-            <p:ph type="body"/>
-          </p:nvPr>
-        </p:nvSpPr>
-        <p:spPr>
-          <a:xfrm>
-            <a:off x="4674240" y="3682080"/>
-            <a:ext cx="4015800" cy="1896840"/>
-          </a:xfrm>
-          <a:prstGeom prst="rect">
-            <a:avLst/>
-          </a:prstGeom>
-        </p:spPr>
-        <p:txBody>
-          <a:bodyPr lIns="0" tIns="0" rIns="0" bIns="0">
-            <a:normAutofit/>
-          </a:bodyPr>
-          <a:lstStyle/>
-          <a:p>
-            <a:endParaRPr lang="de-AT" sz="3200" b="0" strike="noStrike" spc="-1">
-              <a:latin typeface="Arial"/>
-            </a:endParaRPr>
-          </a:p>
-        </p:txBody>
-      </p:sp>
-    </p:spTree>
-  </p:cSld>
-  <p:clrMapOvr>
-    <a:masterClrMapping/>
-  </p:clrMapOvr>
-</p:sldLayout>
-</file>
-
-<file path=ppt/slideLayouts/slideLayout33.xml><?xml version="1.0" encoding="utf-8"?>
-<p:sldLayout xmlns:a="http://schemas.openxmlformats.org/drawingml/2006/main" xmlns:r="http://schemas.openxmlformats.org/officeDocument/2006/relationships" xmlns:p="http://schemas.openxmlformats.org/presentationml/2006/main" type="twoObjOverTx" preserve="1">
-  <p:cSld name="Title, 2 Content over Content">
-    <p:spTree>
-      <p:nvGrpSpPr>
-        <p:cNvPr id="1" name=""/>
-        <p:cNvGrpSpPr/>
-        <p:nvPr/>
-      </p:nvGrpSpPr>
-      <p:grpSpPr>
-        <a:xfrm>
-          <a:off x="0" y="0"/>
-          <a:ext cx="0" cy="0"/>
-          <a:chOff x="0" y="0"/>
-          <a:chExt cx="0" cy="0"/>
-        </a:xfrm>
-      </p:grpSpPr>
-      <p:sp>
-        <p:nvSpPr>
-          <p:cNvPr id="108" name="PlaceHolder 1"/>
-          <p:cNvSpPr>
-            <a:spLocks noGrp="1"/>
-          </p:cNvSpPr>
-          <p:nvPr>
-            <p:ph type="title"/>
-          </p:nvPr>
-        </p:nvSpPr>
-        <p:spPr>
-          <a:xfrm>
-            <a:off x="822960" y="1385640"/>
-            <a:ext cx="7543080" cy="4147200"/>
-          </a:xfrm>
-          <a:prstGeom prst="rect">
-            <a:avLst/>
-          </a:prstGeom>
-        </p:spPr>
-        <p:txBody>
-          <a:bodyPr lIns="0" tIns="0" rIns="0" bIns="0" anchor="ctr">
-            <a:noAutofit/>
-          </a:bodyPr>
-          <a:lstStyle/>
-          <a:p>
-            <a:pPr algn="ctr"/>
-            <a:endParaRPr lang="de-AT" sz="4400" b="0" strike="noStrike" spc="-1">
-              <a:latin typeface="Arial"/>
-            </a:endParaRPr>
-          </a:p>
-        </p:txBody>
-      </p:sp>
-      <p:sp>
-        <p:nvSpPr>
-          <p:cNvPr id="109" name="PlaceHolder 2"/>
-          <p:cNvSpPr>
-            <a:spLocks noGrp="1"/>
-          </p:cNvSpPr>
-          <p:nvPr>
-            <p:ph type="body"/>
-          </p:nvPr>
-        </p:nvSpPr>
-        <p:spPr>
-          <a:xfrm>
-            <a:off x="457200" y="1604520"/>
-            <a:ext cx="4015800" cy="1896840"/>
-          </a:xfrm>
-          <a:prstGeom prst="rect">
-            <a:avLst/>
-          </a:prstGeom>
-        </p:spPr>
-        <p:txBody>
-          <a:bodyPr lIns="0" tIns="0" rIns="0" bIns="0">
-            <a:normAutofit/>
-          </a:bodyPr>
-          <a:lstStyle/>
-          <a:p>
-            <a:endParaRPr lang="de-AT" sz="3200" b="0" strike="noStrike" spc="-1">
-              <a:latin typeface="Arial"/>
-            </a:endParaRPr>
-          </a:p>
-        </p:txBody>
-      </p:sp>
-      <p:sp>
-        <p:nvSpPr>
-          <p:cNvPr id="110" name="PlaceHolder 3"/>
-          <p:cNvSpPr>
-            <a:spLocks noGrp="1"/>
-          </p:cNvSpPr>
-          <p:nvPr>
-            <p:ph type="body"/>
-          </p:nvPr>
-        </p:nvSpPr>
-        <p:spPr>
-          <a:xfrm>
-            <a:off x="4674240" y="1604520"/>
-            <a:ext cx="4015800" cy="1896840"/>
-          </a:xfrm>
-          <a:prstGeom prst="rect">
-            <a:avLst/>
-          </a:prstGeom>
-        </p:spPr>
-        <p:txBody>
-          <a:bodyPr lIns="0" tIns="0" rIns="0" bIns="0">
-            <a:normAutofit/>
-          </a:bodyPr>
-          <a:lstStyle/>
-          <a:p>
-            <a:endParaRPr lang="de-AT" sz="3200" b="0" strike="noStrike" spc="-1">
-              <a:latin typeface="Arial"/>
-            </a:endParaRPr>
-          </a:p>
-        </p:txBody>
-      </p:sp>
-      <p:sp>
-        <p:nvSpPr>
-          <p:cNvPr id="111" name="PlaceHolder 4"/>
-          <p:cNvSpPr>
-            <a:spLocks noGrp="1"/>
-          </p:cNvSpPr>
-          <p:nvPr>
-            <p:ph type="body"/>
-          </p:nvPr>
-        </p:nvSpPr>
-        <p:spPr>
-          <a:xfrm>
-            <a:off x="457200" y="3682080"/>
-            <a:ext cx="8229240" cy="1896840"/>
-          </a:xfrm>
-          <a:prstGeom prst="rect">
-            <a:avLst/>
-          </a:prstGeom>
-        </p:spPr>
-        <p:txBody>
-          <a:bodyPr lIns="0" tIns="0" rIns="0" bIns="0">
-            <a:normAutofit/>
-          </a:bodyPr>
-          <a:lstStyle/>
-          <a:p>
-            <a:endParaRPr lang="de-AT" sz="3200" b="0" strike="noStrike" spc="-1">
-              <a:latin typeface="Arial"/>
-            </a:endParaRPr>
-          </a:p>
-        </p:txBody>
-      </p:sp>
-    </p:spTree>
-  </p:cSld>
-  <p:clrMapOvr>
-    <a:masterClrMapping/>
-  </p:clrMapOvr>
-</p:sldLayout>
-</file>
-
-<file path=ppt/slideLayouts/slideLayout34.xml><?xml version="1.0" encoding="utf-8"?>
-<p:sldLayout xmlns:a="http://schemas.openxmlformats.org/drawingml/2006/main" xmlns:r="http://schemas.openxmlformats.org/officeDocument/2006/relationships" xmlns:p="http://schemas.openxmlformats.org/presentationml/2006/main" type="objOverTx" preserve="1">
-  <p:cSld name="Title, Content over Content">
-    <p:spTree>
-      <p:nvGrpSpPr>
-        <p:cNvPr id="1" name=""/>
-        <p:cNvGrpSpPr/>
-        <p:nvPr/>
-      </p:nvGrpSpPr>
-      <p:grpSpPr>
-        <a:xfrm>
-          <a:off x="0" y="0"/>
-          <a:ext cx="0" cy="0"/>
-          <a:chOff x="0" y="0"/>
-          <a:chExt cx="0" cy="0"/>
-        </a:xfrm>
-      </p:grpSpPr>
-      <p:sp>
-        <p:nvSpPr>
-          <p:cNvPr id="112" name="PlaceHolder 1"/>
-          <p:cNvSpPr>
-            <a:spLocks noGrp="1"/>
-          </p:cNvSpPr>
-          <p:nvPr>
-            <p:ph type="title"/>
-          </p:nvPr>
-        </p:nvSpPr>
-        <p:spPr>
-          <a:xfrm>
-            <a:off x="822960" y="1385640"/>
-            <a:ext cx="7543080" cy="4147200"/>
-          </a:xfrm>
-          <a:prstGeom prst="rect">
-            <a:avLst/>
-          </a:prstGeom>
-        </p:spPr>
-        <p:txBody>
-          <a:bodyPr lIns="0" tIns="0" rIns="0" bIns="0" anchor="ctr">
-            <a:noAutofit/>
-          </a:bodyPr>
-          <a:lstStyle/>
-          <a:p>
-            <a:pPr algn="ctr"/>
-            <a:endParaRPr lang="de-AT" sz="4400" b="0" strike="noStrike" spc="-1">
-              <a:latin typeface="Arial"/>
-            </a:endParaRPr>
-          </a:p>
-        </p:txBody>
-      </p:sp>
-      <p:sp>
-        <p:nvSpPr>
-          <p:cNvPr id="113" name="PlaceHolder 2"/>
-          <p:cNvSpPr>
-            <a:spLocks noGrp="1"/>
-          </p:cNvSpPr>
-          <p:nvPr>
-            <p:ph type="body"/>
-          </p:nvPr>
-        </p:nvSpPr>
-        <p:spPr>
-          <a:xfrm>
-            <a:off x="457200" y="1604520"/>
-            <a:ext cx="8229240" cy="1896840"/>
-          </a:xfrm>
-          <a:prstGeom prst="rect">
-            <a:avLst/>
-          </a:prstGeom>
-        </p:spPr>
-        <p:txBody>
-          <a:bodyPr lIns="0" tIns="0" rIns="0" bIns="0">
-            <a:normAutofit/>
-          </a:bodyPr>
-          <a:lstStyle/>
-          <a:p>
-            <a:endParaRPr lang="de-AT" sz="3200" b="0" strike="noStrike" spc="-1">
-              <a:latin typeface="Arial"/>
-            </a:endParaRPr>
-          </a:p>
-        </p:txBody>
-      </p:sp>
-      <p:sp>
-        <p:nvSpPr>
-          <p:cNvPr id="114" name="PlaceHolder 3"/>
-          <p:cNvSpPr>
-            <a:spLocks noGrp="1"/>
-          </p:cNvSpPr>
-          <p:nvPr>
-            <p:ph type="body"/>
-          </p:nvPr>
-        </p:nvSpPr>
-        <p:spPr>
-          <a:xfrm>
-            <a:off x="457200" y="3682080"/>
-            <a:ext cx="8229240" cy="1896840"/>
-          </a:xfrm>
-          <a:prstGeom prst="rect">
-            <a:avLst/>
-          </a:prstGeom>
-        </p:spPr>
-        <p:txBody>
-          <a:bodyPr lIns="0" tIns="0" rIns="0" bIns="0">
-            <a:normAutofit/>
-          </a:bodyPr>
-          <a:lstStyle/>
-          <a:p>
-            <a:endParaRPr lang="de-AT" sz="3200" b="0" strike="noStrike" spc="-1">
-              <a:latin typeface="Arial"/>
-            </a:endParaRPr>
-          </a:p>
-        </p:txBody>
-      </p:sp>
-    </p:spTree>
-  </p:cSld>
-  <p:clrMapOvr>
-    <a:masterClrMapping/>
-  </p:clrMapOvr>
-</p:sldLayout>
-</file>
-
-<file path=ppt/slideLayouts/slideLayout35.xml><?xml version="1.0" encoding="utf-8"?>
-<p:sldLayout xmlns:a="http://schemas.openxmlformats.org/drawingml/2006/main" xmlns:r="http://schemas.openxmlformats.org/officeDocument/2006/relationships" xmlns:p="http://schemas.openxmlformats.org/presentationml/2006/main" type="fourObj" preserve="1">
-  <p:cSld name="Title, 4 Content">
-    <p:spTree>
-      <p:nvGrpSpPr>
-        <p:cNvPr id="1" name=""/>
-        <p:cNvGrpSpPr/>
-        <p:nvPr/>
-      </p:nvGrpSpPr>
-      <p:grpSpPr>
-        <a:xfrm>
-          <a:off x="0" y="0"/>
-          <a:ext cx="0" cy="0"/>
-          <a:chOff x="0" y="0"/>
-          <a:chExt cx="0" cy="0"/>
-        </a:xfrm>
-      </p:grpSpPr>
-      <p:sp>
-        <p:nvSpPr>
-          <p:cNvPr id="115" name="PlaceHolder 1"/>
-          <p:cNvSpPr>
-            <a:spLocks noGrp="1"/>
-          </p:cNvSpPr>
-          <p:nvPr>
-            <p:ph type="title"/>
-          </p:nvPr>
-        </p:nvSpPr>
-        <p:spPr>
-          <a:xfrm>
-            <a:off x="822960" y="1385640"/>
-            <a:ext cx="7543080" cy="4147200"/>
-          </a:xfrm>
-          <a:prstGeom prst="rect">
-            <a:avLst/>
-          </a:prstGeom>
-        </p:spPr>
-        <p:txBody>
-          <a:bodyPr lIns="0" tIns="0" rIns="0" bIns="0" anchor="ctr">
-            <a:noAutofit/>
-          </a:bodyPr>
-          <a:lstStyle/>
-          <a:p>
-            <a:pPr algn="ctr"/>
-            <a:endParaRPr lang="de-AT" sz="4400" b="0" strike="noStrike" spc="-1">
-              <a:latin typeface="Arial"/>
-            </a:endParaRPr>
-          </a:p>
-        </p:txBody>
-      </p:sp>
-      <p:sp>
-        <p:nvSpPr>
-          <p:cNvPr id="116" name="PlaceHolder 2"/>
-          <p:cNvSpPr>
-            <a:spLocks noGrp="1"/>
-          </p:cNvSpPr>
-          <p:nvPr>
-            <p:ph type="body"/>
-          </p:nvPr>
-        </p:nvSpPr>
-        <p:spPr>
-          <a:xfrm>
-            <a:off x="457200" y="1604520"/>
-            <a:ext cx="4015800" cy="1896840"/>
-          </a:xfrm>
-          <a:prstGeom prst="rect">
-            <a:avLst/>
-          </a:prstGeom>
-        </p:spPr>
-        <p:txBody>
-          <a:bodyPr lIns="0" tIns="0" rIns="0" bIns="0">
-            <a:normAutofit/>
-          </a:bodyPr>
-          <a:lstStyle/>
-          <a:p>
-            <a:endParaRPr lang="de-AT" sz="3200" b="0" strike="noStrike" spc="-1">
-              <a:latin typeface="Arial"/>
-            </a:endParaRPr>
-          </a:p>
-        </p:txBody>
-      </p:sp>
-      <p:sp>
-        <p:nvSpPr>
-          <p:cNvPr id="117" name="PlaceHolder 3"/>
-          <p:cNvSpPr>
-            <a:spLocks noGrp="1"/>
-          </p:cNvSpPr>
-          <p:nvPr>
-            <p:ph type="body"/>
-          </p:nvPr>
-        </p:nvSpPr>
-        <p:spPr>
-          <a:xfrm>
-            <a:off x="4674240" y="1604520"/>
-            <a:ext cx="4015800" cy="1896840"/>
-          </a:xfrm>
-          <a:prstGeom prst="rect">
-            <a:avLst/>
-          </a:prstGeom>
-        </p:spPr>
-        <p:txBody>
-          <a:bodyPr lIns="0" tIns="0" rIns="0" bIns="0">
-            <a:normAutofit/>
-          </a:bodyPr>
-          <a:lstStyle/>
-          <a:p>
-            <a:endParaRPr lang="de-AT" sz="3200" b="0" strike="noStrike" spc="-1">
-              <a:latin typeface="Arial"/>
-            </a:endParaRPr>
-          </a:p>
-        </p:txBody>
-      </p:sp>
-      <p:sp>
-        <p:nvSpPr>
-          <p:cNvPr id="118" name="PlaceHolder 4"/>
-          <p:cNvSpPr>
-            <a:spLocks noGrp="1"/>
-          </p:cNvSpPr>
-          <p:nvPr>
-            <p:ph type="body"/>
-          </p:nvPr>
-        </p:nvSpPr>
-        <p:spPr>
-          <a:xfrm>
-            <a:off x="457200" y="3682080"/>
-            <a:ext cx="4015800" cy="1896840"/>
-          </a:xfrm>
-          <a:prstGeom prst="rect">
-            <a:avLst/>
-          </a:prstGeom>
-        </p:spPr>
-        <p:txBody>
-          <a:bodyPr lIns="0" tIns="0" rIns="0" bIns="0">
-            <a:normAutofit/>
-          </a:bodyPr>
-          <a:lstStyle/>
-          <a:p>
-            <a:endParaRPr lang="de-AT" sz="3200" b="0" strike="noStrike" spc="-1">
-              <a:latin typeface="Arial"/>
-            </a:endParaRPr>
-          </a:p>
-        </p:txBody>
-      </p:sp>
-      <p:sp>
-        <p:nvSpPr>
-          <p:cNvPr id="119" name="PlaceHolder 5"/>
-          <p:cNvSpPr>
-            <a:spLocks noGrp="1"/>
-          </p:cNvSpPr>
-          <p:nvPr>
-            <p:ph type="body"/>
-          </p:nvPr>
-        </p:nvSpPr>
-        <p:spPr>
-          <a:xfrm>
-            <a:off x="4674240" y="3682080"/>
-            <a:ext cx="4015800" cy="1896840"/>
-          </a:xfrm>
-          <a:prstGeom prst="rect">
-            <a:avLst/>
-          </a:prstGeom>
-        </p:spPr>
-        <p:txBody>
-          <a:bodyPr lIns="0" tIns="0" rIns="0" bIns="0">
-            <a:normAutofit/>
-          </a:bodyPr>
-          <a:lstStyle/>
-          <a:p>
-            <a:endParaRPr lang="de-AT" sz="3200" b="0" strike="noStrike" spc="-1">
-              <a:latin typeface="Arial"/>
-            </a:endParaRPr>
-          </a:p>
-        </p:txBody>
-      </p:sp>
-    </p:spTree>
-  </p:cSld>
-  <p:clrMapOvr>
-    <a:masterClrMapping/>
-  </p:clrMapOvr>
-</p:sldLayout>
-</file>
-
-<file path=ppt/slideLayouts/slideLayout36.xml><?xml version="1.0" encoding="utf-8"?>
-<p:sldLayout xmlns:a="http://schemas.openxmlformats.org/drawingml/2006/main" xmlns:r="http://schemas.openxmlformats.org/officeDocument/2006/relationships" xmlns:p="http://schemas.openxmlformats.org/presentationml/2006/main" type="blank" preserve="1">
-  <p:cSld name="Title, 6 Content">
-    <p:spTree>
-      <p:nvGrpSpPr>
-        <p:cNvPr id="1" name=""/>
-        <p:cNvGrpSpPr/>
-        <p:nvPr/>
-      </p:nvGrpSpPr>
-      <p:grpSpPr>
-        <a:xfrm>
-          <a:off x="0" y="0"/>
-          <a:ext cx="0" cy="0"/>
-          <a:chOff x="0" y="0"/>
-          <a:chExt cx="0" cy="0"/>
-        </a:xfrm>
-      </p:grpSpPr>
-      <p:sp>
-        <p:nvSpPr>
-          <p:cNvPr id="120" name="PlaceHolder 1"/>
-          <p:cNvSpPr>
-            <a:spLocks noGrp="1"/>
-          </p:cNvSpPr>
-          <p:nvPr>
-            <p:ph type="title"/>
-          </p:nvPr>
-        </p:nvSpPr>
-        <p:spPr>
-          <a:xfrm>
-            <a:off x="822960" y="1385640"/>
-            <a:ext cx="7543080" cy="4147200"/>
-          </a:xfrm>
-          <a:prstGeom prst="rect">
-            <a:avLst/>
-          </a:prstGeom>
-        </p:spPr>
-        <p:txBody>
-          <a:bodyPr lIns="0" tIns="0" rIns="0" bIns="0" anchor="ctr">
-            <a:noAutofit/>
-          </a:bodyPr>
-          <a:lstStyle/>
-          <a:p>
-            <a:pPr algn="ctr"/>
-            <a:endParaRPr lang="de-AT" sz="4400" b="0" strike="noStrike" spc="-1">
-              <a:latin typeface="Arial"/>
-            </a:endParaRPr>
-          </a:p>
-        </p:txBody>
-      </p:sp>
-      <p:sp>
-        <p:nvSpPr>
-          <p:cNvPr id="121" name="PlaceHolder 2"/>
-          <p:cNvSpPr>
-            <a:spLocks noGrp="1"/>
-          </p:cNvSpPr>
-          <p:nvPr>
-            <p:ph type="body"/>
-          </p:nvPr>
-        </p:nvSpPr>
-        <p:spPr>
-          <a:xfrm>
-            <a:off x="457200" y="1604520"/>
-            <a:ext cx="2649600" cy="1896840"/>
-          </a:xfrm>
-          <a:prstGeom prst="rect">
-            <a:avLst/>
-          </a:prstGeom>
-        </p:spPr>
-        <p:txBody>
-          <a:bodyPr lIns="0" tIns="0" rIns="0" bIns="0">
-            <a:normAutofit/>
-          </a:bodyPr>
-          <a:lstStyle/>
-          <a:p>
-            <a:endParaRPr lang="de-AT" sz="3200" b="0" strike="noStrike" spc="-1">
-              <a:latin typeface="Arial"/>
-            </a:endParaRPr>
-          </a:p>
-        </p:txBody>
-      </p:sp>
-      <p:sp>
-        <p:nvSpPr>
-          <p:cNvPr id="122" name="PlaceHolder 3"/>
-          <p:cNvSpPr>
-            <a:spLocks noGrp="1"/>
-          </p:cNvSpPr>
-          <p:nvPr>
-            <p:ph type="body"/>
-          </p:nvPr>
-        </p:nvSpPr>
-        <p:spPr>
-          <a:xfrm>
-            <a:off x="3239640" y="1604520"/>
-            <a:ext cx="2649600" cy="1896840"/>
-          </a:xfrm>
-          <a:prstGeom prst="rect">
-            <a:avLst/>
-          </a:prstGeom>
-        </p:spPr>
-        <p:txBody>
-          <a:bodyPr lIns="0" tIns="0" rIns="0" bIns="0">
-            <a:normAutofit/>
-          </a:bodyPr>
-          <a:lstStyle/>
-          <a:p>
-            <a:endParaRPr lang="de-AT" sz="3200" b="0" strike="noStrike" spc="-1">
-              <a:latin typeface="Arial"/>
-            </a:endParaRPr>
-          </a:p>
-        </p:txBody>
-      </p:sp>
-      <p:sp>
-        <p:nvSpPr>
-          <p:cNvPr id="123" name="PlaceHolder 4"/>
-          <p:cNvSpPr>
-            <a:spLocks noGrp="1"/>
-          </p:cNvSpPr>
-          <p:nvPr>
-            <p:ph type="body"/>
-          </p:nvPr>
-        </p:nvSpPr>
-        <p:spPr>
-          <a:xfrm>
-            <a:off x="6022080" y="1604520"/>
-            <a:ext cx="2649600" cy="1896840"/>
-          </a:xfrm>
-          <a:prstGeom prst="rect">
-            <a:avLst/>
-          </a:prstGeom>
-        </p:spPr>
-        <p:txBody>
-          <a:bodyPr lIns="0" tIns="0" rIns="0" bIns="0">
-            <a:normAutofit/>
-          </a:bodyPr>
-          <a:lstStyle/>
-          <a:p>
-            <a:endParaRPr lang="de-AT" sz="3200" b="0" strike="noStrike" spc="-1">
-              <a:latin typeface="Arial"/>
-            </a:endParaRPr>
-          </a:p>
-        </p:txBody>
-      </p:sp>
-      <p:sp>
-        <p:nvSpPr>
-          <p:cNvPr id="124" name="PlaceHolder 5"/>
-          <p:cNvSpPr>
-            <a:spLocks noGrp="1"/>
-          </p:cNvSpPr>
-          <p:nvPr>
-            <p:ph type="body"/>
-          </p:nvPr>
-        </p:nvSpPr>
-        <p:spPr>
-          <a:xfrm>
-            <a:off x="457200" y="3682080"/>
-            <a:ext cx="2649600" cy="1896840"/>
-          </a:xfrm>
-          <a:prstGeom prst="rect">
-            <a:avLst/>
-          </a:prstGeom>
-        </p:spPr>
-        <p:txBody>
-          <a:bodyPr lIns="0" tIns="0" rIns="0" bIns="0">
-            <a:normAutofit/>
-          </a:bodyPr>
-          <a:lstStyle/>
-          <a:p>
-            <a:endParaRPr lang="de-AT" sz="3200" b="0" strike="noStrike" spc="-1">
-              <a:latin typeface="Arial"/>
-            </a:endParaRPr>
-          </a:p>
-        </p:txBody>
-      </p:sp>
-      <p:sp>
-        <p:nvSpPr>
-          <p:cNvPr id="125" name="PlaceHolder 6"/>
-          <p:cNvSpPr>
-            <a:spLocks noGrp="1"/>
-          </p:cNvSpPr>
-          <p:nvPr>
-            <p:ph type="body"/>
-          </p:nvPr>
-        </p:nvSpPr>
-        <p:spPr>
-          <a:xfrm>
-            <a:off x="3239640" y="3682080"/>
-            <a:ext cx="2649600" cy="1896840"/>
-          </a:xfrm>
-          <a:prstGeom prst="rect">
-            <a:avLst/>
-          </a:prstGeom>
-        </p:spPr>
-        <p:txBody>
-          <a:bodyPr lIns="0" tIns="0" rIns="0" bIns="0">
-            <a:normAutofit/>
-          </a:bodyPr>
-          <a:lstStyle/>
-          <a:p>
-            <a:endParaRPr lang="de-AT" sz="3200" b="0" strike="noStrike" spc="-1">
-              <a:latin typeface="Arial"/>
-            </a:endParaRPr>
-          </a:p>
-        </p:txBody>
-      </p:sp>
-      <p:sp>
-        <p:nvSpPr>
-          <p:cNvPr id="126" name="PlaceHolder 7"/>
-          <p:cNvSpPr>
-            <a:spLocks noGrp="1"/>
-          </p:cNvSpPr>
-          <p:nvPr>
-            <p:ph type="body"/>
-          </p:nvPr>
-        </p:nvSpPr>
-        <p:spPr>
-          <a:xfrm>
-            <a:off x="6022080" y="3682080"/>
-            <a:ext cx="2649600" cy="1896840"/>
           </a:xfrm>
           <a:prstGeom prst="rect">
             <a:avLst/>
@@ -12109,18 +10680,11 @@
               </a:lnSpc>
             </a:pPr>
             <a:r>
-              <a:rPr lang="en-CA" sz="1050" b="0" strike="noStrike" spc="-1">
-                <a:solidFill>
-                  <a:srgbClr val="000000"/>
-                </a:solidFill>
-                <a:latin typeface="Calibri"/>
-                <a:ea typeface="DejaVu Sans"/>
-              </a:rPr>
-              <a:t>12</a:t>
-            </a:r>
-            <a:endParaRPr lang="de-AT" sz="1050" b="0" strike="noStrike" spc="-1">
-              <a:latin typeface="Arial"/>
-            </a:endParaRPr>
+              <a:rPr lang="de-AT" sz="1050" b="0" strike="noStrike" spc="-1" dirty="0">
+                <a:latin typeface="Arial"/>
+              </a:rPr>
+              <a:t>26</a:t>
+            </a:r>
           </a:p>
         </p:txBody>
       </p:sp>
@@ -12334,629 +10898,6 @@
     <p:sldLayoutId id="2147483671" r:id="rId10"/>
     <p:sldLayoutId id="2147483672" r:id="rId11"/>
     <p:sldLayoutId id="2147483673" r:id="rId12"/>
-  </p:sldLayoutIdLst>
-  <p:txStyles>
-    <p:titleStyle>
-      <a:lvl1pPr algn="l" defTabSz="914400" rtl="0" eaLnBrk="1" latinLnBrk="0" hangingPunct="1">
-        <a:lnSpc>
-          <a:spcPct val="90000"/>
-        </a:lnSpc>
-        <a:spcBef>
-          <a:spcPct val="0"/>
-        </a:spcBef>
-        <a:buNone/>
-        <a:defRPr sz="4400" kern="1200">
-          <a:solidFill>
-            <a:schemeClr val="tx1"/>
-          </a:solidFill>
-          <a:latin typeface="+mj-lt"/>
-          <a:ea typeface="+mj-ea"/>
-          <a:cs typeface="+mj-cs"/>
-        </a:defRPr>
-      </a:lvl1pPr>
-    </p:titleStyle>
-    <p:bodyStyle>
-      <a:lvl1pPr marL="228600" indent="-228600" algn="l" defTabSz="914400" rtl="0" eaLnBrk="1" latinLnBrk="0" hangingPunct="1">
-        <a:lnSpc>
-          <a:spcPct val="90000"/>
-        </a:lnSpc>
-        <a:spcBef>
-          <a:spcPts val="1000"/>
-        </a:spcBef>
-        <a:buFont typeface="Arial" panose="020B0604020202020204" pitchFamily="34" charset="0"/>
-        <a:buChar char="•"/>
-        <a:defRPr sz="2800" kern="1200">
-          <a:solidFill>
-            <a:schemeClr val="tx1"/>
-          </a:solidFill>
-          <a:latin typeface="+mn-lt"/>
-          <a:ea typeface="+mn-ea"/>
-          <a:cs typeface="+mn-cs"/>
-        </a:defRPr>
-      </a:lvl1pPr>
-      <a:lvl2pPr marL="685800" indent="-228600" algn="l" defTabSz="914400" rtl="0" eaLnBrk="1" latinLnBrk="0" hangingPunct="1">
-        <a:lnSpc>
-          <a:spcPct val="90000"/>
-        </a:lnSpc>
-        <a:spcBef>
-          <a:spcPts val="500"/>
-        </a:spcBef>
-        <a:buFont typeface="Arial" panose="020B0604020202020204" pitchFamily="34" charset="0"/>
-        <a:buChar char="•"/>
-        <a:defRPr sz="2400" kern="1200">
-          <a:solidFill>
-            <a:schemeClr val="tx1"/>
-          </a:solidFill>
-          <a:latin typeface="+mn-lt"/>
-          <a:ea typeface="+mn-ea"/>
-          <a:cs typeface="+mn-cs"/>
-        </a:defRPr>
-      </a:lvl2pPr>
-      <a:lvl3pPr marL="1143000" indent="-228600" algn="l" defTabSz="914400" rtl="0" eaLnBrk="1" latinLnBrk="0" hangingPunct="1">
-        <a:lnSpc>
-          <a:spcPct val="90000"/>
-        </a:lnSpc>
-        <a:spcBef>
-          <a:spcPts val="500"/>
-        </a:spcBef>
-        <a:buFont typeface="Arial" panose="020B0604020202020204" pitchFamily="34" charset="0"/>
-        <a:buChar char="•"/>
-        <a:defRPr sz="2000" kern="1200">
-          <a:solidFill>
-            <a:schemeClr val="tx1"/>
-          </a:solidFill>
-          <a:latin typeface="+mn-lt"/>
-          <a:ea typeface="+mn-ea"/>
-          <a:cs typeface="+mn-cs"/>
-        </a:defRPr>
-      </a:lvl3pPr>
-      <a:lvl4pPr marL="1600200" indent="-228600" algn="l" defTabSz="914400" rtl="0" eaLnBrk="1" latinLnBrk="0" hangingPunct="1">
-        <a:lnSpc>
-          <a:spcPct val="90000"/>
-        </a:lnSpc>
-        <a:spcBef>
-          <a:spcPts val="500"/>
-        </a:spcBef>
-        <a:buFont typeface="Arial" panose="020B0604020202020204" pitchFamily="34" charset="0"/>
-        <a:buChar char="•"/>
-        <a:defRPr sz="1800" kern="1200">
-          <a:solidFill>
-            <a:schemeClr val="tx1"/>
-          </a:solidFill>
-          <a:latin typeface="+mn-lt"/>
-          <a:ea typeface="+mn-ea"/>
-          <a:cs typeface="+mn-cs"/>
-        </a:defRPr>
-      </a:lvl4pPr>
-      <a:lvl5pPr marL="2057400" indent="-228600" algn="l" defTabSz="914400" rtl="0" eaLnBrk="1" latinLnBrk="0" hangingPunct="1">
-        <a:lnSpc>
-          <a:spcPct val="90000"/>
-        </a:lnSpc>
-        <a:spcBef>
-          <a:spcPts val="500"/>
-        </a:spcBef>
-        <a:buFont typeface="Arial" panose="020B0604020202020204" pitchFamily="34" charset="0"/>
-        <a:buChar char="•"/>
-        <a:defRPr sz="1800" kern="1200">
-          <a:solidFill>
-            <a:schemeClr val="tx1"/>
-          </a:solidFill>
-          <a:latin typeface="+mn-lt"/>
-          <a:ea typeface="+mn-ea"/>
-          <a:cs typeface="+mn-cs"/>
-        </a:defRPr>
-      </a:lvl5pPr>
-      <a:lvl6pPr marL="2514600" indent="-228600" algn="l" defTabSz="914400" rtl="0" eaLnBrk="1" latinLnBrk="0" hangingPunct="1">
-        <a:lnSpc>
-          <a:spcPct val="90000"/>
-        </a:lnSpc>
-        <a:spcBef>
-          <a:spcPts val="500"/>
-        </a:spcBef>
-        <a:buFont typeface="Arial" panose="020B0604020202020204" pitchFamily="34" charset="0"/>
-        <a:buChar char="•"/>
-        <a:defRPr sz="1800" kern="1200">
-          <a:solidFill>
-            <a:schemeClr val="tx1"/>
-          </a:solidFill>
-          <a:latin typeface="+mn-lt"/>
-          <a:ea typeface="+mn-ea"/>
-          <a:cs typeface="+mn-cs"/>
-        </a:defRPr>
-      </a:lvl6pPr>
-      <a:lvl7pPr marL="2971800" indent="-228600" algn="l" defTabSz="914400" rtl="0" eaLnBrk="1" latinLnBrk="0" hangingPunct="1">
-        <a:lnSpc>
-          <a:spcPct val="90000"/>
-        </a:lnSpc>
-        <a:spcBef>
-          <a:spcPts val="500"/>
-        </a:spcBef>
-        <a:buFont typeface="Arial" panose="020B0604020202020204" pitchFamily="34" charset="0"/>
-        <a:buChar char="•"/>
-        <a:defRPr sz="1800" kern="1200">
-          <a:solidFill>
-            <a:schemeClr val="tx1"/>
-          </a:solidFill>
-          <a:latin typeface="+mn-lt"/>
-          <a:ea typeface="+mn-ea"/>
-          <a:cs typeface="+mn-cs"/>
-        </a:defRPr>
-      </a:lvl7pPr>
-      <a:lvl8pPr marL="3429000" indent="-228600" algn="l" defTabSz="914400" rtl="0" eaLnBrk="1" latinLnBrk="0" hangingPunct="1">
-        <a:lnSpc>
-          <a:spcPct val="90000"/>
-        </a:lnSpc>
-        <a:spcBef>
-          <a:spcPts val="500"/>
-        </a:spcBef>
-        <a:buFont typeface="Arial" panose="020B0604020202020204" pitchFamily="34" charset="0"/>
-        <a:buChar char="•"/>
-        <a:defRPr sz="1800" kern="1200">
-          <a:solidFill>
-            <a:schemeClr val="tx1"/>
-          </a:solidFill>
-          <a:latin typeface="+mn-lt"/>
-          <a:ea typeface="+mn-ea"/>
-          <a:cs typeface="+mn-cs"/>
-        </a:defRPr>
-      </a:lvl8pPr>
-      <a:lvl9pPr marL="3886200" indent="-228600" algn="l" defTabSz="914400" rtl="0" eaLnBrk="1" latinLnBrk="0" hangingPunct="1">
-        <a:lnSpc>
-          <a:spcPct val="90000"/>
-        </a:lnSpc>
-        <a:spcBef>
-          <a:spcPts val="500"/>
-        </a:spcBef>
-        <a:buFont typeface="Arial" panose="020B0604020202020204" pitchFamily="34" charset="0"/>
-        <a:buChar char="•"/>
-        <a:defRPr sz="1800" kern="1200">
-          <a:solidFill>
-            <a:schemeClr val="tx1"/>
-          </a:solidFill>
-          <a:latin typeface="+mn-lt"/>
-          <a:ea typeface="+mn-ea"/>
-          <a:cs typeface="+mn-cs"/>
-        </a:defRPr>
-      </a:lvl9pPr>
-    </p:bodyStyle>
-    <p:otherStyle>
-      <a:defPPr>
-        <a:defRPr lang="de-DE"/>
-      </a:defPPr>
-      <a:lvl1pPr marL="0" algn="l" defTabSz="914400" rtl="0" eaLnBrk="1" latinLnBrk="0" hangingPunct="1">
-        <a:defRPr sz="1800" kern="1200">
-          <a:solidFill>
-            <a:schemeClr val="tx1"/>
-          </a:solidFill>
-          <a:latin typeface="+mn-lt"/>
-          <a:ea typeface="+mn-ea"/>
-          <a:cs typeface="+mn-cs"/>
-        </a:defRPr>
-      </a:lvl1pPr>
-      <a:lvl2pPr marL="457200" algn="l" defTabSz="914400" rtl="0" eaLnBrk="1" latinLnBrk="0" hangingPunct="1">
-        <a:defRPr sz="1800" kern="1200">
-          <a:solidFill>
-            <a:schemeClr val="tx1"/>
-          </a:solidFill>
-          <a:latin typeface="+mn-lt"/>
-          <a:ea typeface="+mn-ea"/>
-          <a:cs typeface="+mn-cs"/>
-        </a:defRPr>
-      </a:lvl2pPr>
-      <a:lvl3pPr marL="914400" algn="l" defTabSz="914400" rtl="0" eaLnBrk="1" latinLnBrk="0" hangingPunct="1">
-        <a:defRPr sz="1800" kern="1200">
-          <a:solidFill>
-            <a:schemeClr val="tx1"/>
-          </a:solidFill>
-          <a:latin typeface="+mn-lt"/>
-          <a:ea typeface="+mn-ea"/>
-          <a:cs typeface="+mn-cs"/>
-        </a:defRPr>
-      </a:lvl3pPr>
-      <a:lvl4pPr marL="1371600" algn="l" defTabSz="914400" rtl="0" eaLnBrk="1" latinLnBrk="0" hangingPunct="1">
-        <a:defRPr sz="1800" kern="1200">
-          <a:solidFill>
-            <a:schemeClr val="tx1"/>
-          </a:solidFill>
-          <a:latin typeface="+mn-lt"/>
-          <a:ea typeface="+mn-ea"/>
-          <a:cs typeface="+mn-cs"/>
-        </a:defRPr>
-      </a:lvl4pPr>
-      <a:lvl5pPr marL="1828800" algn="l" defTabSz="914400" rtl="0" eaLnBrk="1" latinLnBrk="0" hangingPunct="1">
-        <a:defRPr sz="1800" kern="1200">
-          <a:solidFill>
-            <a:schemeClr val="tx1"/>
-          </a:solidFill>
-          <a:latin typeface="+mn-lt"/>
-          <a:ea typeface="+mn-ea"/>
-          <a:cs typeface="+mn-cs"/>
-        </a:defRPr>
-      </a:lvl5pPr>
-      <a:lvl6pPr marL="2286000" algn="l" defTabSz="914400" rtl="0" eaLnBrk="1" latinLnBrk="0" hangingPunct="1">
-        <a:defRPr sz="1800" kern="1200">
-          <a:solidFill>
-            <a:schemeClr val="tx1"/>
-          </a:solidFill>
-          <a:latin typeface="+mn-lt"/>
-          <a:ea typeface="+mn-ea"/>
-          <a:cs typeface="+mn-cs"/>
-        </a:defRPr>
-      </a:lvl6pPr>
-      <a:lvl7pPr marL="2743200" algn="l" defTabSz="914400" rtl="0" eaLnBrk="1" latinLnBrk="0" hangingPunct="1">
-        <a:defRPr sz="1800" kern="1200">
-          <a:solidFill>
-            <a:schemeClr val="tx1"/>
-          </a:solidFill>
-          <a:latin typeface="+mn-lt"/>
-          <a:ea typeface="+mn-ea"/>
-          <a:cs typeface="+mn-cs"/>
-        </a:defRPr>
-      </a:lvl7pPr>
-      <a:lvl8pPr marL="3200400" algn="l" defTabSz="914400" rtl="0" eaLnBrk="1" latinLnBrk="0" hangingPunct="1">
-        <a:defRPr sz="1800" kern="1200">
-          <a:solidFill>
-            <a:schemeClr val="tx1"/>
-          </a:solidFill>
-          <a:latin typeface="+mn-lt"/>
-          <a:ea typeface="+mn-ea"/>
-          <a:cs typeface="+mn-cs"/>
-        </a:defRPr>
-      </a:lvl8pPr>
-      <a:lvl9pPr marL="3657600" algn="l" defTabSz="914400" rtl="0" eaLnBrk="1" latinLnBrk="0" hangingPunct="1">
-        <a:defRPr sz="1800" kern="1200">
-          <a:solidFill>
-            <a:schemeClr val="tx1"/>
-          </a:solidFill>
-          <a:latin typeface="+mn-lt"/>
-          <a:ea typeface="+mn-ea"/>
-          <a:cs typeface="+mn-cs"/>
-        </a:defRPr>
-      </a:lvl9pPr>
-    </p:otherStyle>
-  </p:txStyles>
-</p:sldMaster>
-</file>
-
-<file path=ppt/slideMasters/slideMaster3.xml><?xml version="1.0" encoding="utf-8"?>
-<p:sldMaster xmlns:a="http://schemas.openxmlformats.org/drawingml/2006/main" xmlns:r="http://schemas.openxmlformats.org/officeDocument/2006/relationships" xmlns:p="http://schemas.openxmlformats.org/presentationml/2006/main">
-  <p:cSld>
-    <p:bg>
-      <p:bgPr>
-        <a:solidFill>
-          <a:srgbClr val="FFFFFF"/>
-        </a:solidFill>
-        <a:effectLst/>
-      </p:bgPr>
-    </p:bg>
-    <p:spTree>
-      <p:nvGrpSpPr>
-        <p:cNvPr id="1" name=""/>
-        <p:cNvGrpSpPr/>
-        <p:nvPr/>
-      </p:nvGrpSpPr>
-      <p:grpSpPr>
-        <a:xfrm>
-          <a:off x="0" y="0"/>
-          <a:ext cx="0" cy="0"/>
-          <a:chOff x="0" y="0"/>
-          <a:chExt cx="0" cy="0"/>
-        </a:xfrm>
-      </p:grpSpPr>
-      <p:pic>
-        <p:nvPicPr>
-          <p:cNvPr id="86" name="Picture 7"/>
-          <p:cNvPicPr/>
-          <p:nvPr/>
-        </p:nvPicPr>
-        <p:blipFill>
-          <a:blip r:embed="rId14"/>
-          <a:srcRect l="-2" r="-6522"/>
-          <a:stretch/>
-        </p:blipFill>
-        <p:spPr>
-          <a:xfrm>
-            <a:off x="127440" y="6338880"/>
-            <a:ext cx="1219320" cy="433080"/>
-          </a:xfrm>
-          <a:prstGeom prst="rect">
-            <a:avLst/>
-          </a:prstGeom>
-          <a:ln>
-            <a:noFill/>
-          </a:ln>
-        </p:spPr>
-      </p:pic>
-      <p:pic>
-        <p:nvPicPr>
-          <p:cNvPr id="87" name="Picture 17"/>
-          <p:cNvPicPr/>
-          <p:nvPr/>
-        </p:nvPicPr>
-        <p:blipFill>
-          <a:blip r:embed="rId15"/>
-          <a:stretch/>
-        </p:blipFill>
-        <p:spPr>
-          <a:xfrm>
-            <a:off x="7405560" y="6341400"/>
-            <a:ext cx="1585440" cy="441720"/>
-          </a:xfrm>
-          <a:prstGeom prst="rect">
-            <a:avLst/>
-          </a:prstGeom>
-          <a:ln>
-            <a:noFill/>
-          </a:ln>
-        </p:spPr>
-      </p:pic>
-      <p:sp>
-        <p:nvSpPr>
-          <p:cNvPr id="88" name="CustomShape 1"/>
-          <p:cNvSpPr/>
-          <p:nvPr/>
-        </p:nvSpPr>
-        <p:spPr>
-          <a:xfrm>
-            <a:off x="4392720" y="6415200"/>
-            <a:ext cx="352800" cy="356760"/>
-          </a:xfrm>
-          <a:prstGeom prst="rect">
-            <a:avLst/>
-          </a:prstGeom>
-          <a:noFill/>
-          <a:ln>
-            <a:noFill/>
-          </a:ln>
-        </p:spPr>
-        <p:style>
-          <a:lnRef idx="0">
-            <a:scrgbClr r="0" g="0" b="0"/>
-          </a:lnRef>
-          <a:fillRef idx="0">
-            <a:scrgbClr r="0" g="0" b="0"/>
-          </a:fillRef>
-          <a:effectRef idx="0">
-            <a:scrgbClr r="0" g="0" b="0"/>
-          </a:effectRef>
-          <a:fontRef idx="minor"/>
-        </p:style>
-        <p:txBody>
-          <a:bodyPr lIns="90000" tIns="45000" rIns="90000" bIns="45000" anchor="ctr">
-            <a:noAutofit/>
-          </a:bodyPr>
-          <a:lstStyle/>
-          <a:p>
-            <a:pPr algn="r">
-              <a:lnSpc>
-                <a:spcPct val="100000"/>
-              </a:lnSpc>
-            </a:pPr>
-            <a:r>
-              <a:rPr lang="en-CA" sz="1050" b="0" strike="noStrike" spc="-1">
-                <a:solidFill>
-                  <a:srgbClr val="000000"/>
-                </a:solidFill>
-                <a:latin typeface="Calibri"/>
-                <a:ea typeface="DejaVu Sans"/>
-              </a:rPr>
-              <a:t>12</a:t>
-            </a:r>
-            <a:endParaRPr lang="de-AT" sz="1050" b="0" strike="noStrike" spc="-1">
-              <a:latin typeface="Arial"/>
-            </a:endParaRPr>
-          </a:p>
-        </p:txBody>
-      </p:sp>
-      <p:sp>
-        <p:nvSpPr>
-          <p:cNvPr id="89" name="PlaceHolder 2"/>
-          <p:cNvSpPr>
-            <a:spLocks noGrp="1"/>
-          </p:cNvSpPr>
-          <p:nvPr>
-            <p:ph type="title"/>
-          </p:nvPr>
-        </p:nvSpPr>
-        <p:spPr>
-          <a:xfrm>
-            <a:off x="822960" y="1385640"/>
-            <a:ext cx="7543080" cy="4147200"/>
-          </a:xfrm>
-          <a:prstGeom prst="rect">
-            <a:avLst/>
-          </a:prstGeom>
-        </p:spPr>
-        <p:txBody>
-          <a:bodyPr lIns="0" tIns="0" rIns="0" bIns="0" anchor="ctr">
-            <a:noAutofit/>
-          </a:bodyPr>
-          <a:lstStyle/>
-          <a:p>
-            <a:r>
-              <a:rPr lang="de-AT" sz="1800" b="0" strike="noStrike" spc="-1">
-                <a:latin typeface="Arial"/>
-              </a:rPr>
-              <a:t>Format des Titeltextes durch Klicken bearbeiten</a:t>
-            </a:r>
-          </a:p>
-        </p:txBody>
-      </p:sp>
-      <p:sp>
-        <p:nvSpPr>
-          <p:cNvPr id="90" name="PlaceHolder 3"/>
-          <p:cNvSpPr>
-            <a:spLocks noGrp="1"/>
-          </p:cNvSpPr>
-          <p:nvPr>
-            <p:ph type="body"/>
-          </p:nvPr>
-        </p:nvSpPr>
-        <p:spPr>
-          <a:xfrm>
-            <a:off x="457200" y="1604520"/>
-            <a:ext cx="8229240" cy="3977280"/>
-          </a:xfrm>
-          <a:prstGeom prst="rect">
-            <a:avLst/>
-          </a:prstGeom>
-        </p:spPr>
-        <p:txBody>
-          <a:bodyPr lIns="0" tIns="0" rIns="0" bIns="0">
-            <a:normAutofit/>
-          </a:bodyPr>
-          <a:lstStyle/>
-          <a:p>
-            <a:pPr marL="432000" indent="-324000">
-              <a:spcBef>
-                <a:spcPts val="1417"/>
-              </a:spcBef>
-              <a:buClr>
-                <a:srgbClr val="000000"/>
-              </a:buClr>
-              <a:buSzPct val="45000"/>
-              <a:buFont typeface="Wingdings" charset="2"/>
-              <a:buChar char=""/>
-            </a:pPr>
-            <a:r>
-              <a:rPr lang="de-AT" sz="3200" b="0" strike="noStrike" spc="-1">
-                <a:latin typeface="Arial"/>
-              </a:rPr>
-              <a:t>Format des Gliederungstextes durch Klicken bearbeiten</a:t>
-            </a:r>
-          </a:p>
-          <a:p>
-            <a:pPr marL="864000" lvl="1" indent="-324000">
-              <a:spcBef>
-                <a:spcPts val="1134"/>
-              </a:spcBef>
-              <a:buClr>
-                <a:srgbClr val="000000"/>
-              </a:buClr>
-              <a:buSzPct val="75000"/>
-              <a:buFont typeface="Symbol" charset="2"/>
-              <a:buChar char=""/>
-            </a:pPr>
-            <a:r>
-              <a:rPr lang="de-AT" sz="2800" b="0" strike="noStrike" spc="-1">
-                <a:latin typeface="Arial"/>
-              </a:rPr>
-              <a:t>Zweite Gliederungsebene</a:t>
-            </a:r>
-          </a:p>
-          <a:p>
-            <a:pPr marL="1296000" lvl="2" indent="-288000">
-              <a:spcBef>
-                <a:spcPts val="850"/>
-              </a:spcBef>
-              <a:buClr>
-                <a:srgbClr val="000000"/>
-              </a:buClr>
-              <a:buSzPct val="45000"/>
-              <a:buFont typeface="Wingdings" charset="2"/>
-              <a:buChar char=""/>
-            </a:pPr>
-            <a:r>
-              <a:rPr lang="de-AT" sz="2400" b="0" strike="noStrike" spc="-1">
-                <a:latin typeface="Arial"/>
-              </a:rPr>
-              <a:t>Dritte Gliederungsebene</a:t>
-            </a:r>
-          </a:p>
-          <a:p>
-            <a:pPr marL="1728000" lvl="3" indent="-216000">
-              <a:spcBef>
-                <a:spcPts val="567"/>
-              </a:spcBef>
-              <a:buClr>
-                <a:srgbClr val="000000"/>
-              </a:buClr>
-              <a:buSzPct val="75000"/>
-              <a:buFont typeface="Symbol" charset="2"/>
-              <a:buChar char=""/>
-            </a:pPr>
-            <a:r>
-              <a:rPr lang="de-AT" sz="2000" b="0" strike="noStrike" spc="-1">
-                <a:latin typeface="Arial"/>
-              </a:rPr>
-              <a:t>Vierte Gliederungsebene</a:t>
-            </a:r>
-          </a:p>
-          <a:p>
-            <a:pPr marL="2160000" lvl="4" indent="-216000">
-              <a:spcBef>
-                <a:spcPts val="283"/>
-              </a:spcBef>
-              <a:buClr>
-                <a:srgbClr val="000000"/>
-              </a:buClr>
-              <a:buSzPct val="45000"/>
-              <a:buFont typeface="Wingdings" charset="2"/>
-              <a:buChar char=""/>
-            </a:pPr>
-            <a:r>
-              <a:rPr lang="de-AT" sz="2000" b="0" strike="noStrike" spc="-1">
-                <a:latin typeface="Arial"/>
-              </a:rPr>
-              <a:t>Fünfte Gliederungsebene</a:t>
-            </a:r>
-          </a:p>
-          <a:p>
-            <a:pPr marL="2592000" lvl="5" indent="-216000">
-              <a:spcBef>
-                <a:spcPts val="283"/>
-              </a:spcBef>
-              <a:buClr>
-                <a:srgbClr val="000000"/>
-              </a:buClr>
-              <a:buSzPct val="45000"/>
-              <a:buFont typeface="Wingdings" charset="2"/>
-              <a:buChar char=""/>
-            </a:pPr>
-            <a:r>
-              <a:rPr lang="de-AT" sz="2000" b="0" strike="noStrike" spc="-1">
-                <a:latin typeface="Arial"/>
-              </a:rPr>
-              <a:t>Sechste Gliederungsebene</a:t>
-            </a:r>
-          </a:p>
-          <a:p>
-            <a:pPr marL="3024000" lvl="6" indent="-216000">
-              <a:spcBef>
-                <a:spcPts val="283"/>
-              </a:spcBef>
-              <a:buClr>
-                <a:srgbClr val="000000"/>
-              </a:buClr>
-              <a:buSzPct val="45000"/>
-              <a:buFont typeface="Wingdings" charset="2"/>
-              <a:buChar char=""/>
-            </a:pPr>
-            <a:r>
-              <a:rPr lang="de-AT" sz="2000" b="0" strike="noStrike" spc="-1">
-                <a:latin typeface="Arial"/>
-              </a:rPr>
-              <a:t>Siebte Gliederungsebene</a:t>
-            </a:r>
-          </a:p>
-        </p:txBody>
-      </p:sp>
-    </p:spTree>
-  </p:cSld>
-  <p:clrMap bg1="lt1" tx1="dk1" bg2="lt2" tx2="dk2" accent1="accent1" accent2="accent2" accent3="accent3" accent4="accent4" accent5="accent5" accent6="accent6" hlink="hlink" folHlink="folHlink"/>
-  <p:sldLayoutIdLst>
-    <p:sldLayoutId id="2147483675" r:id="rId1"/>
-    <p:sldLayoutId id="2147483676" r:id="rId2"/>
-    <p:sldLayoutId id="2147483677" r:id="rId3"/>
-    <p:sldLayoutId id="2147483678" r:id="rId4"/>
-    <p:sldLayoutId id="2147483679" r:id="rId5"/>
-    <p:sldLayoutId id="2147483680" r:id="rId6"/>
-    <p:sldLayoutId id="2147483681" r:id="rId7"/>
-    <p:sldLayoutId id="2147483682" r:id="rId8"/>
-    <p:sldLayoutId id="2147483683" r:id="rId9"/>
-    <p:sldLayoutId id="2147483684" r:id="rId10"/>
-    <p:sldLayoutId id="2147483685" r:id="rId11"/>
-    <p:sldLayoutId id="2147483686" r:id="rId12"/>
   </p:sldLayoutIdLst>
   <p:txStyles>
     <p:titleStyle>
@@ -17282,85 +15223,241 @@
               </a:spcBef>
             </a:pPr>
             <a:r>
-              <a:rPr lang="de-DE" sz="2000" b="0" strike="noStrike" spc="-1">
-                <a:solidFill>
-                  <a:srgbClr val="000000"/>
-                </a:solidFill>
-                <a:latin typeface="Arial"/>
-                <a:ea typeface="DejaVu Sans"/>
-              </a:rPr>
-              <a:t>Example: </a:t>
-            </a:r>
-            <a:endParaRPr lang="de-AT" sz="2000" b="0" strike="noStrike" spc="-1">
-              <a:latin typeface="Arial"/>
-            </a:endParaRPr>
-          </a:p>
-          <a:p>
-            <a:pPr marL="108360">
+              <a:rPr lang="de-DE" sz="2000" b="0" strike="noStrike" spc="-1" dirty="0" err="1">
+                <a:solidFill>
+                  <a:srgbClr val="000000"/>
+                </a:solidFill>
+                <a:latin typeface="Arial"/>
+                <a:ea typeface="DejaVu Sans"/>
+              </a:rPr>
+              <a:t>Example</a:t>
+            </a:r>
+            <a:r>
+              <a:rPr lang="de-DE" sz="2000" b="0" strike="noStrike" spc="-1" dirty="0">
+                <a:solidFill>
+                  <a:srgbClr val="000000"/>
+                </a:solidFill>
+                <a:latin typeface="Arial"/>
+                <a:ea typeface="DejaVu Sans"/>
+              </a:rPr>
+              <a:t>: </a:t>
+            </a:r>
+            <a:endParaRPr lang="de-AT" sz="2000" b="0" strike="noStrike" spc="-1" dirty="0">
+              <a:latin typeface="Arial"/>
+            </a:endParaRPr>
+          </a:p>
+          <a:p>
+            <a:pPr marL="451260" indent="-342900">
               <a:lnSpc>
                 <a:spcPct val="100000"/>
               </a:lnSpc>
               <a:spcBef>
                 <a:spcPts val="1417"/>
               </a:spcBef>
-            </a:pPr>
-            <a:r>
-              <a:rPr lang="de-DE" sz="2000" b="0" strike="noStrike" spc="-1">
-                <a:solidFill>
-                  <a:srgbClr val="000000"/>
-                </a:solidFill>
-                <a:latin typeface="Arial"/>
-                <a:ea typeface="DejaVu Sans"/>
-              </a:rPr>
-              <a:t>* 8 bit full adder</a:t>
-            </a:r>
-            <a:endParaRPr lang="de-AT" sz="2000" b="0" strike="noStrike" spc="-1">
-              <a:latin typeface="Arial"/>
-            </a:endParaRPr>
-          </a:p>
-          <a:p>
-            <a:pPr marL="108360">
+              <a:buFont typeface="Arial" panose="020B0604020202020204" pitchFamily="34" charset="0"/>
+              <a:buChar char="•"/>
+            </a:pPr>
+            <a:r>
+              <a:rPr lang="de-DE" sz="2000" b="0" strike="noStrike" spc="-1" dirty="0">
+                <a:solidFill>
+                  <a:srgbClr val="000000"/>
+                </a:solidFill>
+                <a:latin typeface="Arial"/>
+                <a:ea typeface="DejaVu Sans"/>
+              </a:rPr>
+              <a:t>8 </a:t>
+            </a:r>
+            <a:r>
+              <a:rPr lang="de-DE" sz="2000" b="0" strike="noStrike" spc="-1" dirty="0" err="1">
+                <a:solidFill>
+                  <a:srgbClr val="000000"/>
+                </a:solidFill>
+                <a:latin typeface="Arial"/>
+                <a:ea typeface="DejaVu Sans"/>
+              </a:rPr>
+              <a:t>bit</a:t>
+            </a:r>
+            <a:r>
+              <a:rPr lang="de-DE" sz="2000" b="0" strike="noStrike" spc="-1" dirty="0">
+                <a:solidFill>
+                  <a:srgbClr val="000000"/>
+                </a:solidFill>
+                <a:latin typeface="Arial"/>
+                <a:ea typeface="DejaVu Sans"/>
+              </a:rPr>
+              <a:t> </a:t>
+            </a:r>
+            <a:r>
+              <a:rPr lang="de-DE" sz="2000" b="0" strike="noStrike" spc="-1" dirty="0" err="1">
+                <a:solidFill>
+                  <a:srgbClr val="000000"/>
+                </a:solidFill>
+                <a:latin typeface="Arial"/>
+                <a:ea typeface="DejaVu Sans"/>
+              </a:rPr>
+              <a:t>full</a:t>
+            </a:r>
+            <a:r>
+              <a:rPr lang="de-DE" sz="2000" b="0" strike="noStrike" spc="-1" dirty="0">
+                <a:solidFill>
+                  <a:srgbClr val="000000"/>
+                </a:solidFill>
+                <a:latin typeface="Arial"/>
+                <a:ea typeface="DejaVu Sans"/>
+              </a:rPr>
+              <a:t> </a:t>
+            </a:r>
+            <a:r>
+              <a:rPr lang="de-DE" sz="2000" b="0" strike="noStrike" spc="-1" dirty="0" err="1">
+                <a:solidFill>
+                  <a:srgbClr val="000000"/>
+                </a:solidFill>
+                <a:latin typeface="Arial"/>
+                <a:ea typeface="DejaVu Sans"/>
+              </a:rPr>
+              <a:t>adder</a:t>
+            </a:r>
+            <a:endParaRPr lang="de-AT" sz="2000" b="0" strike="noStrike" spc="-1" dirty="0">
+              <a:latin typeface="Arial"/>
+            </a:endParaRPr>
+          </a:p>
+          <a:p>
+            <a:pPr marL="451260" indent="-342900">
               <a:lnSpc>
                 <a:spcPct val="100000"/>
               </a:lnSpc>
               <a:spcBef>
                 <a:spcPts val="1417"/>
               </a:spcBef>
-            </a:pPr>
-            <a:r>
-              <a:rPr lang="de-DE" sz="2000" b="0" strike="noStrike" spc="-1">
-                <a:solidFill>
-                  <a:srgbClr val="000000"/>
-                </a:solidFill>
-                <a:latin typeface="Arial"/>
-                <a:ea typeface="DejaVu Sans"/>
-              </a:rPr>
-              <a:t>* 2^(8*2) = 65536 input combinations</a:t>
-            </a:r>
-            <a:endParaRPr lang="de-AT" sz="2000" b="0" strike="noStrike" spc="-1">
-              <a:latin typeface="Arial"/>
-            </a:endParaRPr>
-          </a:p>
-          <a:p>
-            <a:pPr marL="108360">
+              <a:buFont typeface="Arial" panose="020B0604020202020204" pitchFamily="34" charset="0"/>
+              <a:buChar char="•"/>
+            </a:pPr>
+            <a:r>
+              <a:rPr lang="de-DE" sz="2000" b="0" strike="noStrike" spc="-1" dirty="0">
+                <a:solidFill>
+                  <a:srgbClr val="000000"/>
+                </a:solidFill>
+                <a:latin typeface="Arial"/>
+                <a:ea typeface="DejaVu Sans"/>
+              </a:rPr>
+              <a:t>2^(8*2) = 65536 </a:t>
+            </a:r>
+            <a:r>
+              <a:rPr lang="de-DE" sz="2000" b="0" strike="noStrike" spc="-1" dirty="0" err="1">
+                <a:solidFill>
+                  <a:srgbClr val="000000"/>
+                </a:solidFill>
+                <a:latin typeface="Arial"/>
+                <a:ea typeface="DejaVu Sans"/>
+              </a:rPr>
+              <a:t>input</a:t>
+            </a:r>
+            <a:r>
+              <a:rPr lang="de-DE" sz="2000" b="0" strike="noStrike" spc="-1" dirty="0">
+                <a:solidFill>
+                  <a:srgbClr val="000000"/>
+                </a:solidFill>
+                <a:latin typeface="Arial"/>
+                <a:ea typeface="DejaVu Sans"/>
+              </a:rPr>
+              <a:t> </a:t>
+            </a:r>
+            <a:r>
+              <a:rPr lang="de-DE" sz="2000" b="0" strike="noStrike" spc="-1" dirty="0" err="1">
+                <a:solidFill>
+                  <a:srgbClr val="000000"/>
+                </a:solidFill>
+                <a:latin typeface="Arial"/>
+                <a:ea typeface="DejaVu Sans"/>
+              </a:rPr>
+              <a:t>combinations</a:t>
+            </a:r>
+            <a:endParaRPr lang="de-AT" sz="2000" b="0" strike="noStrike" spc="-1" dirty="0">
+              <a:latin typeface="Arial"/>
+            </a:endParaRPr>
+          </a:p>
+          <a:p>
+            <a:pPr marL="451260" indent="-342900">
               <a:lnSpc>
                 <a:spcPct val="100000"/>
               </a:lnSpc>
               <a:spcBef>
                 <a:spcPts val="1417"/>
               </a:spcBef>
-            </a:pPr>
-            <a:r>
-              <a:rPr lang="de-DE" sz="2000" b="0" strike="noStrike" spc="-1">
-                <a:solidFill>
-                  <a:srgbClr val="000000"/>
-                </a:solidFill>
-                <a:latin typeface="Arial"/>
-                <a:ea typeface="DejaVu Sans"/>
-              </a:rPr>
-              <a:t>* BDDs for output bit „1“</a:t>
-            </a:r>
-            <a:endParaRPr lang="de-AT" sz="2000" b="0" strike="noStrike" spc="-1">
+              <a:buFont typeface="Arial" panose="020B0604020202020204" pitchFamily="34" charset="0"/>
+              <a:buChar char="•"/>
+            </a:pPr>
+            <a:r>
+              <a:rPr lang="de-DE" sz="2000" b="0" strike="noStrike" spc="-1" dirty="0">
+                <a:solidFill>
+                  <a:srgbClr val="000000"/>
+                </a:solidFill>
+                <a:latin typeface="Arial"/>
+                <a:ea typeface="DejaVu Sans"/>
+              </a:rPr>
+              <a:t>BDDs </a:t>
+            </a:r>
+            <a:r>
+              <a:rPr lang="de-DE" sz="2000" b="0" strike="noStrike" spc="-1" dirty="0" err="1">
+                <a:solidFill>
+                  <a:srgbClr val="000000"/>
+                </a:solidFill>
+                <a:latin typeface="Arial"/>
+                <a:ea typeface="DejaVu Sans"/>
+              </a:rPr>
+              <a:t>for</a:t>
+            </a:r>
+            <a:r>
+              <a:rPr lang="de-DE" sz="2000" b="0" strike="noStrike" spc="-1" dirty="0">
+                <a:solidFill>
+                  <a:srgbClr val="000000"/>
+                </a:solidFill>
+                <a:latin typeface="Arial"/>
+                <a:ea typeface="DejaVu Sans"/>
+              </a:rPr>
+              <a:t> </a:t>
+            </a:r>
+            <a:r>
+              <a:rPr lang="de-DE" sz="2000" b="0" strike="noStrike" spc="-1" dirty="0" err="1">
+                <a:solidFill>
+                  <a:srgbClr val="000000"/>
+                </a:solidFill>
+                <a:latin typeface="Arial"/>
+                <a:ea typeface="DejaVu Sans"/>
+              </a:rPr>
+              <a:t>output</a:t>
+            </a:r>
+            <a:r>
+              <a:rPr lang="de-DE" sz="2000" b="0" strike="noStrike" spc="-1" dirty="0">
+                <a:solidFill>
+                  <a:srgbClr val="000000"/>
+                </a:solidFill>
+                <a:latin typeface="Arial"/>
+                <a:ea typeface="DejaVu Sans"/>
+              </a:rPr>
+              <a:t> </a:t>
+            </a:r>
+            <a:r>
+              <a:rPr lang="de-DE" sz="2000" b="0" strike="noStrike" spc="-1" dirty="0" err="1">
+                <a:solidFill>
+                  <a:srgbClr val="000000"/>
+                </a:solidFill>
+                <a:latin typeface="Arial"/>
+                <a:ea typeface="DejaVu Sans"/>
+              </a:rPr>
+              <a:t>bit</a:t>
+            </a:r>
+            <a:r>
+              <a:rPr lang="de-DE" sz="2000" b="0" strike="noStrike" spc="-1" dirty="0">
+                <a:solidFill>
+                  <a:srgbClr val="000000"/>
+                </a:solidFill>
+                <a:latin typeface="Arial"/>
+                <a:ea typeface="DejaVu Sans"/>
+              </a:rPr>
+              <a:t> „1“</a:t>
+            </a:r>
+            <a:endParaRPr lang="de-AT" sz="2000" b="0" strike="noStrike" spc="-1" dirty="0">
               <a:latin typeface="Arial"/>
             </a:endParaRPr>
           </a:p>
@@ -17373,7 +15470,7 @@
                 <a:spcPts val="1417"/>
               </a:spcBef>
             </a:pPr>
-            <a:endParaRPr lang="de-AT" sz="2000" b="0" strike="noStrike" spc="-1">
+            <a:endParaRPr lang="de-AT" sz="2000" b="0" strike="noStrike" spc="-1" dirty="0">
               <a:latin typeface="Arial"/>
             </a:endParaRPr>
           </a:p>
@@ -17387,7 +15484,7 @@
               </a:spcBef>
             </a:pPr>
             <a:r>
-              <a:rPr lang="de-DE" sz="2000" b="0" strike="noStrike" spc="-1">
+              <a:rPr lang="de-DE" sz="2000" b="0" strike="noStrike" spc="-1" dirty="0">
                 <a:solidFill>
                   <a:srgbClr val="000000"/>
                 </a:solidFill>
@@ -17397,16 +15494,46 @@
               <a:t></a:t>
             </a:r>
             <a:r>
-              <a:rPr lang="de-DE" sz="2000" b="0" strike="noStrike" spc="-1">
-                <a:solidFill>
-                  <a:srgbClr val="000000"/>
-                </a:solidFill>
-                <a:latin typeface="Arial"/>
-                <a:ea typeface="DejaVu Sans"/>
-              </a:rPr>
-              <a:t> Approximate: 31 nodes</a:t>
-            </a:r>
-            <a:endParaRPr lang="de-AT" sz="2000" b="0" strike="noStrike" spc="-1">
+              <a:rPr lang="de-DE" sz="2000" b="0" strike="noStrike" spc="-1" dirty="0">
+                <a:solidFill>
+                  <a:srgbClr val="000000"/>
+                </a:solidFill>
+                <a:latin typeface="Arial"/>
+                <a:ea typeface="DejaVu Sans"/>
+              </a:rPr>
+              <a:t> </a:t>
+            </a:r>
+            <a:r>
+              <a:rPr lang="de-DE" sz="2000" b="0" strike="noStrike" spc="-1" dirty="0" err="1">
+                <a:solidFill>
+                  <a:srgbClr val="000000"/>
+                </a:solidFill>
+                <a:latin typeface="Arial"/>
+                <a:ea typeface="DejaVu Sans"/>
+              </a:rPr>
+              <a:t>Approximate</a:t>
+            </a:r>
+            <a:r>
+              <a:rPr lang="de-DE" sz="2000" b="0" strike="noStrike" spc="-1" dirty="0">
+                <a:solidFill>
+                  <a:srgbClr val="000000"/>
+                </a:solidFill>
+                <a:latin typeface="Arial"/>
+                <a:ea typeface="DejaVu Sans"/>
+              </a:rPr>
+              <a:t>: 31 </a:t>
+            </a:r>
+            <a:r>
+              <a:rPr lang="de-DE" sz="2000" b="0" strike="noStrike" spc="-1" dirty="0" err="1">
+                <a:solidFill>
+                  <a:srgbClr val="000000"/>
+                </a:solidFill>
+                <a:latin typeface="Arial"/>
+                <a:ea typeface="DejaVu Sans"/>
+              </a:rPr>
+              <a:t>nodes</a:t>
+            </a:r>
+            <a:endParaRPr lang="de-AT" sz="2000" b="0" strike="noStrike" spc="-1" dirty="0">
               <a:latin typeface="Arial"/>
             </a:endParaRPr>
           </a:p>
@@ -17420,7 +15547,7 @@
               </a:spcBef>
             </a:pPr>
             <a:r>
-              <a:rPr lang="de-DE" sz="2000" b="0" strike="noStrike" spc="-1">
+              <a:rPr lang="de-DE" sz="2000" b="0" strike="noStrike" spc="-1" dirty="0">
                 <a:solidFill>
                   <a:srgbClr val="000000"/>
                 </a:solidFill>
@@ -17429,7 +15556,7 @@
               </a:rPr>
               <a:t>		</a:t>
             </a:r>
-            <a:endParaRPr lang="de-AT" sz="2000" b="0" strike="noStrike" spc="-1">
+            <a:endParaRPr lang="de-AT" sz="2000" b="0" strike="noStrike" spc="-1" dirty="0">
               <a:latin typeface="Arial"/>
             </a:endParaRPr>
           </a:p>
@@ -17443,17 +15570,57 @@
               </a:spcBef>
             </a:pPr>
             <a:r>
-              <a:rPr lang="de-DE" sz="2000" b="0" strike="noStrike" spc="-1">
-                <a:solidFill>
-                  <a:srgbClr val="000000"/>
-                </a:solidFill>
-                <a:latin typeface="Arial"/>
-                <a:ea typeface="DejaVu Sans"/>
-              </a:rPr>
-              <a:t>			Exact: 49 nodes </a:t>
-            </a:r>
-            <a:r>
-              <a:rPr lang="de-DE" sz="2000" b="0" strike="noStrike" spc="-1">
+              <a:rPr lang="de-DE" sz="2000" b="0" strike="noStrike" spc="-1" dirty="0">
+                <a:solidFill>
+                  <a:srgbClr val="000000"/>
+                </a:solidFill>
+                <a:latin typeface="Arial"/>
+                <a:ea typeface="DejaVu Sans"/>
+              </a:rPr>
+              <a:t>			</a:t>
+            </a:r>
+            <a:r>
+              <a:rPr lang="de-DE" sz="2000" b="0" strike="noStrike" spc="-1" dirty="0" err="1">
+                <a:solidFill>
+                  <a:srgbClr val="000000"/>
+                </a:solidFill>
+                <a:latin typeface="Arial"/>
+                <a:ea typeface="DejaVu Sans"/>
+              </a:rPr>
+              <a:t>Exact</a:t>
+            </a:r>
+            <a:r>
+              <a:rPr lang="de-DE" sz="2000" b="0" strike="noStrike" spc="-1" dirty="0">
+                <a:solidFill>
+                  <a:srgbClr val="000000"/>
+                </a:solidFill>
+                <a:latin typeface="Arial"/>
+                <a:ea typeface="DejaVu Sans"/>
+              </a:rPr>
+              <a:t>: 49 </a:t>
+            </a:r>
+            <a:r>
+              <a:rPr lang="de-DE" sz="2000" b="0" strike="noStrike" spc="-1" dirty="0" err="1">
+                <a:solidFill>
+                  <a:srgbClr val="000000"/>
+                </a:solidFill>
+                <a:latin typeface="Arial"/>
+                <a:ea typeface="DejaVu Sans"/>
+              </a:rPr>
+              <a:t>nodes</a:t>
+            </a:r>
+            <a:r>
+              <a:rPr lang="de-DE" sz="2000" b="0" strike="noStrike" spc="-1" dirty="0">
+                <a:solidFill>
+                  <a:srgbClr val="000000"/>
+                </a:solidFill>
+                <a:latin typeface="Arial"/>
+                <a:ea typeface="DejaVu Sans"/>
+              </a:rPr>
+              <a:t> </a:t>
+            </a:r>
+            <a:r>
+              <a:rPr lang="de-DE" sz="2000" b="0" strike="noStrike" spc="-1" dirty="0">
                 <a:solidFill>
                   <a:srgbClr val="000000"/>
                 </a:solidFill>
@@ -17462,7 +15629,7 @@
               </a:rPr>
               <a:t></a:t>
             </a:r>
-            <a:endParaRPr lang="de-AT" sz="2000" b="0" strike="noStrike" spc="-1">
+            <a:endParaRPr lang="de-AT" sz="2000" b="0" strike="noStrike" spc="-1" dirty="0">
               <a:latin typeface="Arial"/>
             </a:endParaRPr>
           </a:p>
@@ -17823,85 +15990,241 @@
               </a:spcBef>
             </a:pPr>
             <a:r>
-              <a:rPr lang="de-DE" sz="2000" b="0" strike="noStrike" spc="-1">
-                <a:solidFill>
-                  <a:srgbClr val="000000"/>
-                </a:solidFill>
-                <a:latin typeface="Arial"/>
-                <a:ea typeface="DejaVu Sans"/>
-              </a:rPr>
-              <a:t>Example: </a:t>
-            </a:r>
-            <a:endParaRPr lang="de-AT" sz="2000" b="0" strike="noStrike" spc="-1">
-              <a:latin typeface="Arial"/>
-            </a:endParaRPr>
-          </a:p>
-          <a:p>
-            <a:pPr marL="108360">
+              <a:rPr lang="de-DE" sz="2000" b="0" strike="noStrike" spc="-1" dirty="0" err="1">
+                <a:solidFill>
+                  <a:srgbClr val="000000"/>
+                </a:solidFill>
+                <a:latin typeface="Arial"/>
+                <a:ea typeface="DejaVu Sans"/>
+              </a:rPr>
+              <a:t>Example</a:t>
+            </a:r>
+            <a:r>
+              <a:rPr lang="de-DE" sz="2000" b="0" strike="noStrike" spc="-1" dirty="0">
+                <a:solidFill>
+                  <a:srgbClr val="000000"/>
+                </a:solidFill>
+                <a:latin typeface="Arial"/>
+                <a:ea typeface="DejaVu Sans"/>
+              </a:rPr>
+              <a:t>: </a:t>
+            </a:r>
+            <a:endParaRPr lang="de-AT" sz="2000" b="0" strike="noStrike" spc="-1" dirty="0">
+              <a:latin typeface="Arial"/>
+            </a:endParaRPr>
+          </a:p>
+          <a:p>
+            <a:pPr marL="451260" indent="-342900">
               <a:lnSpc>
                 <a:spcPct val="100000"/>
               </a:lnSpc>
               <a:spcBef>
                 <a:spcPts val="1417"/>
               </a:spcBef>
-            </a:pPr>
-            <a:r>
-              <a:rPr lang="de-DE" sz="2000" b="0" strike="noStrike" spc="-1">
-                <a:solidFill>
-                  <a:srgbClr val="000000"/>
-                </a:solidFill>
-                <a:latin typeface="Arial"/>
-                <a:ea typeface="DejaVu Sans"/>
-              </a:rPr>
-              <a:t>* 8 bit full adder</a:t>
-            </a:r>
-            <a:endParaRPr lang="de-AT" sz="2000" b="0" strike="noStrike" spc="-1">
-              <a:latin typeface="Arial"/>
-            </a:endParaRPr>
-          </a:p>
-          <a:p>
-            <a:pPr marL="108360">
+              <a:buFont typeface="Arial" panose="020B0604020202020204" pitchFamily="34" charset="0"/>
+              <a:buChar char="•"/>
+            </a:pPr>
+            <a:r>
+              <a:rPr lang="de-DE" sz="2000" b="0" strike="noStrike" spc="-1" dirty="0">
+                <a:solidFill>
+                  <a:srgbClr val="000000"/>
+                </a:solidFill>
+                <a:latin typeface="Arial"/>
+                <a:ea typeface="DejaVu Sans"/>
+              </a:rPr>
+              <a:t>8 </a:t>
+            </a:r>
+            <a:r>
+              <a:rPr lang="de-DE" sz="2000" b="0" strike="noStrike" spc="-1" dirty="0" err="1">
+                <a:solidFill>
+                  <a:srgbClr val="000000"/>
+                </a:solidFill>
+                <a:latin typeface="Arial"/>
+                <a:ea typeface="DejaVu Sans"/>
+              </a:rPr>
+              <a:t>bit</a:t>
+            </a:r>
+            <a:r>
+              <a:rPr lang="de-DE" sz="2000" b="0" strike="noStrike" spc="-1" dirty="0">
+                <a:solidFill>
+                  <a:srgbClr val="000000"/>
+                </a:solidFill>
+                <a:latin typeface="Arial"/>
+                <a:ea typeface="DejaVu Sans"/>
+              </a:rPr>
+              <a:t> </a:t>
+            </a:r>
+            <a:r>
+              <a:rPr lang="de-DE" sz="2000" b="0" strike="noStrike" spc="-1" dirty="0" err="1">
+                <a:solidFill>
+                  <a:srgbClr val="000000"/>
+                </a:solidFill>
+                <a:latin typeface="Arial"/>
+                <a:ea typeface="DejaVu Sans"/>
+              </a:rPr>
+              <a:t>full</a:t>
+            </a:r>
+            <a:r>
+              <a:rPr lang="de-DE" sz="2000" b="0" strike="noStrike" spc="-1" dirty="0">
+                <a:solidFill>
+                  <a:srgbClr val="000000"/>
+                </a:solidFill>
+                <a:latin typeface="Arial"/>
+                <a:ea typeface="DejaVu Sans"/>
+              </a:rPr>
+              <a:t> </a:t>
+            </a:r>
+            <a:r>
+              <a:rPr lang="de-DE" sz="2000" b="0" strike="noStrike" spc="-1" dirty="0" err="1">
+                <a:solidFill>
+                  <a:srgbClr val="000000"/>
+                </a:solidFill>
+                <a:latin typeface="Arial"/>
+                <a:ea typeface="DejaVu Sans"/>
+              </a:rPr>
+              <a:t>adder</a:t>
+            </a:r>
+            <a:endParaRPr lang="de-AT" sz="2000" b="0" strike="noStrike" spc="-1" dirty="0">
+              <a:latin typeface="Arial"/>
+            </a:endParaRPr>
+          </a:p>
+          <a:p>
+            <a:pPr marL="451260" indent="-342900">
               <a:lnSpc>
                 <a:spcPct val="100000"/>
               </a:lnSpc>
               <a:spcBef>
                 <a:spcPts val="1417"/>
               </a:spcBef>
-            </a:pPr>
-            <a:r>
-              <a:rPr lang="de-DE" sz="2000" b="0" strike="noStrike" spc="-1">
-                <a:solidFill>
-                  <a:srgbClr val="000000"/>
-                </a:solidFill>
-                <a:latin typeface="Arial"/>
-                <a:ea typeface="DejaVu Sans"/>
-              </a:rPr>
-              <a:t>* 2^(8*2) = 65536 input combinations</a:t>
-            </a:r>
-            <a:endParaRPr lang="de-AT" sz="2000" b="0" strike="noStrike" spc="-1">
-              <a:latin typeface="Arial"/>
-            </a:endParaRPr>
-          </a:p>
-          <a:p>
-            <a:pPr marL="108360">
+              <a:buFont typeface="Arial" panose="020B0604020202020204" pitchFamily="34" charset="0"/>
+              <a:buChar char="•"/>
+            </a:pPr>
+            <a:r>
+              <a:rPr lang="de-DE" sz="2000" b="0" strike="noStrike" spc="-1" dirty="0">
+                <a:solidFill>
+                  <a:srgbClr val="000000"/>
+                </a:solidFill>
+                <a:latin typeface="Arial"/>
+                <a:ea typeface="DejaVu Sans"/>
+              </a:rPr>
+              <a:t>2^(8*2) = 65536 </a:t>
+            </a:r>
+            <a:r>
+              <a:rPr lang="de-DE" sz="2000" b="0" strike="noStrike" spc="-1" dirty="0" err="1">
+                <a:solidFill>
+                  <a:srgbClr val="000000"/>
+                </a:solidFill>
+                <a:latin typeface="Arial"/>
+                <a:ea typeface="DejaVu Sans"/>
+              </a:rPr>
+              <a:t>input</a:t>
+            </a:r>
+            <a:r>
+              <a:rPr lang="de-DE" sz="2000" b="0" strike="noStrike" spc="-1" dirty="0">
+                <a:solidFill>
+                  <a:srgbClr val="000000"/>
+                </a:solidFill>
+                <a:latin typeface="Arial"/>
+                <a:ea typeface="DejaVu Sans"/>
+              </a:rPr>
+              <a:t> </a:t>
+            </a:r>
+            <a:r>
+              <a:rPr lang="de-DE" sz="2000" b="0" strike="noStrike" spc="-1" dirty="0" err="1">
+                <a:solidFill>
+                  <a:srgbClr val="000000"/>
+                </a:solidFill>
+                <a:latin typeface="Arial"/>
+                <a:ea typeface="DejaVu Sans"/>
+              </a:rPr>
+              <a:t>combinations</a:t>
+            </a:r>
+            <a:endParaRPr lang="de-AT" sz="2000" b="0" strike="noStrike" spc="-1" dirty="0">
+              <a:latin typeface="Arial"/>
+            </a:endParaRPr>
+          </a:p>
+          <a:p>
+            <a:pPr marL="451260" indent="-342900">
               <a:lnSpc>
                 <a:spcPct val="100000"/>
               </a:lnSpc>
               <a:spcBef>
                 <a:spcPts val="1417"/>
               </a:spcBef>
-            </a:pPr>
-            <a:r>
-              <a:rPr lang="de-DE" sz="2000" b="0" strike="noStrike" spc="-1">
-                <a:solidFill>
-                  <a:srgbClr val="000000"/>
-                </a:solidFill>
-                <a:latin typeface="Arial"/>
-                <a:ea typeface="DejaVu Sans"/>
-              </a:rPr>
-              <a:t>* BDDs for output bit „1“</a:t>
-            </a:r>
-            <a:endParaRPr lang="de-AT" sz="2000" b="0" strike="noStrike" spc="-1">
+              <a:buFont typeface="Arial" panose="020B0604020202020204" pitchFamily="34" charset="0"/>
+              <a:buChar char="•"/>
+            </a:pPr>
+            <a:r>
+              <a:rPr lang="de-DE" sz="2000" b="0" strike="noStrike" spc="-1" dirty="0">
+                <a:solidFill>
+                  <a:srgbClr val="000000"/>
+                </a:solidFill>
+                <a:latin typeface="Arial"/>
+                <a:ea typeface="DejaVu Sans"/>
+              </a:rPr>
+              <a:t>BDDs </a:t>
+            </a:r>
+            <a:r>
+              <a:rPr lang="de-DE" sz="2000" b="0" strike="noStrike" spc="-1" dirty="0" err="1">
+                <a:solidFill>
+                  <a:srgbClr val="000000"/>
+                </a:solidFill>
+                <a:latin typeface="Arial"/>
+                <a:ea typeface="DejaVu Sans"/>
+              </a:rPr>
+              <a:t>for</a:t>
+            </a:r>
+            <a:r>
+              <a:rPr lang="de-DE" sz="2000" b="0" strike="noStrike" spc="-1" dirty="0">
+                <a:solidFill>
+                  <a:srgbClr val="000000"/>
+                </a:solidFill>
+                <a:latin typeface="Arial"/>
+                <a:ea typeface="DejaVu Sans"/>
+              </a:rPr>
+              <a:t> </a:t>
+            </a:r>
+            <a:r>
+              <a:rPr lang="de-DE" sz="2000" b="0" strike="noStrike" spc="-1" dirty="0" err="1">
+                <a:solidFill>
+                  <a:srgbClr val="000000"/>
+                </a:solidFill>
+                <a:latin typeface="Arial"/>
+                <a:ea typeface="DejaVu Sans"/>
+              </a:rPr>
+              <a:t>output</a:t>
+            </a:r>
+            <a:r>
+              <a:rPr lang="de-DE" sz="2000" b="0" strike="noStrike" spc="-1" dirty="0">
+                <a:solidFill>
+                  <a:srgbClr val="000000"/>
+                </a:solidFill>
+                <a:latin typeface="Arial"/>
+                <a:ea typeface="DejaVu Sans"/>
+              </a:rPr>
+              <a:t> </a:t>
+            </a:r>
+            <a:r>
+              <a:rPr lang="de-DE" sz="2000" b="0" strike="noStrike" spc="-1" dirty="0" err="1">
+                <a:solidFill>
+                  <a:srgbClr val="000000"/>
+                </a:solidFill>
+                <a:latin typeface="Arial"/>
+                <a:ea typeface="DejaVu Sans"/>
+              </a:rPr>
+              <a:t>bit</a:t>
+            </a:r>
+            <a:r>
+              <a:rPr lang="de-DE" sz="2000" b="0" strike="noStrike" spc="-1" dirty="0">
+                <a:solidFill>
+                  <a:srgbClr val="000000"/>
+                </a:solidFill>
+                <a:latin typeface="Arial"/>
+                <a:ea typeface="DejaVu Sans"/>
+              </a:rPr>
+              <a:t> „1“</a:t>
+            </a:r>
+            <a:endParaRPr lang="de-AT" sz="2000" b="0" strike="noStrike" spc="-1" dirty="0">
               <a:latin typeface="Arial"/>
             </a:endParaRPr>
           </a:p>
@@ -17914,7 +16237,7 @@
                 <a:spcPts val="1417"/>
               </a:spcBef>
             </a:pPr>
-            <a:endParaRPr lang="de-AT" sz="2000" b="0" strike="noStrike" spc="-1">
+            <a:endParaRPr lang="de-AT" sz="2000" b="0" strike="noStrike" spc="-1" dirty="0">
               <a:latin typeface="Arial"/>
             </a:endParaRPr>
           </a:p>
@@ -17928,7 +16251,7 @@
               </a:spcBef>
             </a:pPr>
             <a:r>
-              <a:rPr lang="de-DE" sz="2000" b="0" strike="noStrike" spc="-1">
+              <a:rPr lang="de-DE" sz="2000" b="0" strike="noStrike" spc="-1" dirty="0">
                 <a:solidFill>
                   <a:srgbClr val="000000"/>
                 </a:solidFill>
@@ -17938,16 +16261,46 @@
               <a:t></a:t>
             </a:r>
             <a:r>
-              <a:rPr lang="de-DE" sz="2000" b="0" strike="noStrike" spc="-1">
-                <a:solidFill>
-                  <a:srgbClr val="000000"/>
-                </a:solidFill>
-                <a:latin typeface="Arial"/>
-                <a:ea typeface="DejaVu Sans"/>
-              </a:rPr>
-              <a:t> Approximate: 31 nodes</a:t>
-            </a:r>
-            <a:endParaRPr lang="de-AT" sz="2000" b="0" strike="noStrike" spc="-1">
+              <a:rPr lang="de-DE" sz="2000" b="0" strike="noStrike" spc="-1" dirty="0">
+                <a:solidFill>
+                  <a:srgbClr val="000000"/>
+                </a:solidFill>
+                <a:latin typeface="Arial"/>
+                <a:ea typeface="DejaVu Sans"/>
+              </a:rPr>
+              <a:t> </a:t>
+            </a:r>
+            <a:r>
+              <a:rPr lang="de-DE" sz="2000" b="0" strike="noStrike" spc="-1" dirty="0" err="1">
+                <a:solidFill>
+                  <a:srgbClr val="000000"/>
+                </a:solidFill>
+                <a:latin typeface="Arial"/>
+                <a:ea typeface="DejaVu Sans"/>
+              </a:rPr>
+              <a:t>Approximate</a:t>
+            </a:r>
+            <a:r>
+              <a:rPr lang="de-DE" sz="2000" b="0" strike="noStrike" spc="-1" dirty="0">
+                <a:solidFill>
+                  <a:srgbClr val="000000"/>
+                </a:solidFill>
+                <a:latin typeface="Arial"/>
+                <a:ea typeface="DejaVu Sans"/>
+              </a:rPr>
+              <a:t>: 31 </a:t>
+            </a:r>
+            <a:r>
+              <a:rPr lang="de-DE" sz="2000" b="0" strike="noStrike" spc="-1" dirty="0" err="1">
+                <a:solidFill>
+                  <a:srgbClr val="000000"/>
+                </a:solidFill>
+                <a:latin typeface="Arial"/>
+                <a:ea typeface="DejaVu Sans"/>
+              </a:rPr>
+              <a:t>nodes</a:t>
+            </a:r>
+            <a:endParaRPr lang="de-AT" sz="2000" b="0" strike="noStrike" spc="-1" dirty="0">
               <a:latin typeface="Arial"/>
             </a:endParaRPr>
           </a:p>
@@ -17961,7 +16314,7 @@
               </a:spcBef>
             </a:pPr>
             <a:r>
-              <a:rPr lang="de-DE" sz="2000" b="0" strike="noStrike" spc="-1">
+              <a:rPr lang="de-DE" sz="2000" b="0" strike="noStrike" spc="-1" dirty="0">
                 <a:solidFill>
                   <a:srgbClr val="000000"/>
                 </a:solidFill>
@@ -17970,7 +16323,7 @@
               </a:rPr>
               <a:t>		</a:t>
             </a:r>
-            <a:endParaRPr lang="de-AT" sz="2000" b="0" strike="noStrike" spc="-1">
+            <a:endParaRPr lang="de-AT" sz="2000" b="0" strike="noStrike" spc="-1" dirty="0">
               <a:latin typeface="Arial"/>
             </a:endParaRPr>
           </a:p>
@@ -17984,17 +16337,57 @@
               </a:spcBef>
             </a:pPr>
             <a:r>
-              <a:rPr lang="de-DE" sz="2000" b="0" strike="noStrike" spc="-1">
-                <a:solidFill>
-                  <a:srgbClr val="000000"/>
-                </a:solidFill>
-                <a:latin typeface="Arial"/>
-                <a:ea typeface="DejaVu Sans"/>
-              </a:rPr>
-              <a:t>			Exact: 49 nodes </a:t>
-            </a:r>
-            <a:r>
-              <a:rPr lang="de-DE" sz="2000" b="0" strike="noStrike" spc="-1">
+              <a:rPr lang="de-DE" sz="2000" b="0" strike="noStrike" spc="-1" dirty="0">
+                <a:solidFill>
+                  <a:srgbClr val="000000"/>
+                </a:solidFill>
+                <a:latin typeface="Arial"/>
+                <a:ea typeface="DejaVu Sans"/>
+              </a:rPr>
+              <a:t>			</a:t>
+            </a:r>
+            <a:r>
+              <a:rPr lang="de-DE" sz="2000" b="0" strike="noStrike" spc="-1" dirty="0" err="1">
+                <a:solidFill>
+                  <a:srgbClr val="000000"/>
+                </a:solidFill>
+                <a:latin typeface="Arial"/>
+                <a:ea typeface="DejaVu Sans"/>
+              </a:rPr>
+              <a:t>Exact</a:t>
+            </a:r>
+            <a:r>
+              <a:rPr lang="de-DE" sz="2000" b="0" strike="noStrike" spc="-1" dirty="0">
+                <a:solidFill>
+                  <a:srgbClr val="000000"/>
+                </a:solidFill>
+                <a:latin typeface="Arial"/>
+                <a:ea typeface="DejaVu Sans"/>
+              </a:rPr>
+              <a:t>: 49 </a:t>
+            </a:r>
+            <a:r>
+              <a:rPr lang="de-DE" sz="2000" b="0" strike="noStrike" spc="-1" dirty="0" err="1">
+                <a:solidFill>
+                  <a:srgbClr val="000000"/>
+                </a:solidFill>
+                <a:latin typeface="Arial"/>
+                <a:ea typeface="DejaVu Sans"/>
+              </a:rPr>
+              <a:t>nodes</a:t>
+            </a:r>
+            <a:r>
+              <a:rPr lang="de-DE" sz="2000" b="0" strike="noStrike" spc="-1" dirty="0">
+                <a:solidFill>
+                  <a:srgbClr val="000000"/>
+                </a:solidFill>
+                <a:latin typeface="Arial"/>
+                <a:ea typeface="DejaVu Sans"/>
+              </a:rPr>
+              <a:t> </a:t>
+            </a:r>
+            <a:r>
+              <a:rPr lang="de-DE" sz="2000" b="0" strike="noStrike" spc="-1" dirty="0">
                 <a:solidFill>
                   <a:srgbClr val="000000"/>
                 </a:solidFill>
@@ -18003,7 +16396,7 @@
               </a:rPr>
               <a:t></a:t>
             </a:r>
-            <a:endParaRPr lang="de-AT" sz="2000" b="0" strike="noStrike" spc="-1">
+            <a:endParaRPr lang="de-AT" sz="2000" b="0" strike="noStrike" spc="-1" dirty="0">
               <a:latin typeface="Arial"/>
             </a:endParaRPr>
           </a:p>
@@ -18127,20 +16520,73 @@
           </a:bodyPr>
           <a:lstStyle/>
           <a:p>
-            <a:r>
-              <a:rPr lang="de-AT" sz="2000" b="0" strike="noStrike" spc="-1">
-                <a:latin typeface="Arial"/>
-              </a:rPr>
-              <a:t>* 64 bit adder ?</a:t>
-            </a:r>
-          </a:p>
-          <a:p>
-            <a:r>
-              <a:rPr lang="de-AT" sz="2000" b="0" strike="noStrike" spc="-1">
-                <a:latin typeface="Arial"/>
-              </a:rPr>
-              <a:t>* 2^(64*2) = 3.4E38 input combinations</a:t>
-            </a:r>
+            <a:pPr marL="342900" indent="-342900">
+              <a:buFont typeface="Arial" panose="020B0604020202020204" pitchFamily="34" charset="0"/>
+              <a:buChar char="•"/>
+            </a:pPr>
+            <a:r>
+              <a:rPr lang="de-AT" sz="2000" b="0" strike="noStrike" spc="-1" dirty="0">
+                <a:latin typeface="Arial"/>
+              </a:rPr>
+              <a:t>64 </a:t>
+            </a:r>
+            <a:r>
+              <a:rPr lang="de-AT" sz="2000" b="0" strike="noStrike" spc="-1" dirty="0" err="1">
+                <a:latin typeface="Arial"/>
+              </a:rPr>
+              <a:t>bit</a:t>
+            </a:r>
+            <a:r>
+              <a:rPr lang="de-AT" sz="2000" b="0" strike="noStrike" spc="-1" dirty="0">
+                <a:latin typeface="Arial"/>
+              </a:rPr>
+              <a:t> </a:t>
+            </a:r>
+            <a:r>
+              <a:rPr lang="de-AT" sz="2000" b="0" strike="noStrike" spc="-1" dirty="0" err="1">
+                <a:latin typeface="Arial"/>
+              </a:rPr>
+              <a:t>adder</a:t>
+            </a:r>
+            <a:r>
+              <a:rPr lang="de-AT" sz="2000" b="0" strike="noStrike" spc="-1" dirty="0">
+                <a:latin typeface="Arial"/>
+              </a:rPr>
+              <a:t> ?</a:t>
+            </a:r>
+          </a:p>
+          <a:p>
+            <a:pPr marL="342900" indent="-342900">
+              <a:buFont typeface="Arial" panose="020B0604020202020204" pitchFamily="34" charset="0"/>
+              <a:buChar char="•"/>
+            </a:pPr>
+            <a:r>
+              <a:rPr lang="de-AT" sz="2000" b="0" strike="noStrike" spc="-1" dirty="0">
+                <a:latin typeface="Arial"/>
+              </a:rPr>
+              <a:t>2^(64*2) = 3.4E38 </a:t>
+            </a:r>
+            <a:r>
+              <a:rPr lang="de-AT" sz="2000" b="0" strike="noStrike" spc="-1" dirty="0" err="1">
+                <a:latin typeface="Arial"/>
+              </a:rPr>
+              <a:t>input</a:t>
+            </a:r>
+            <a:r>
+              <a:rPr lang="de-AT" sz="2000" b="0" strike="noStrike" spc="-1" dirty="0">
+                <a:latin typeface="Arial"/>
+              </a:rPr>
+              <a:t> </a:t>
+            </a:r>
+            <a:r>
+              <a:rPr lang="de-AT" sz="2000" b="0" strike="noStrike" spc="-1" dirty="0" err="1">
+                <a:latin typeface="Arial"/>
+              </a:rPr>
+              <a:t>combinations</a:t>
+            </a:r>
+            <a:endParaRPr lang="de-AT" sz="2000" b="0" strike="noStrike" spc="-1" dirty="0">
+              <a:latin typeface="Arial"/>
+            </a:endParaRPr>
           </a:p>
         </p:txBody>
       </p:sp>
@@ -18395,12 +16841,49 @@
           </a:bodyPr>
           <a:lstStyle/>
           <a:p>
-            <a:r>
-              <a:rPr lang="de-AT" sz="1800" b="0" strike="noStrike" spc="-1">
-                <a:latin typeface="Arial"/>
-              </a:rPr>
-              <a:t>* Error BDD for 8 bit adders</a:t>
-            </a:r>
+            <a:pPr marL="285750" indent="-285750">
+              <a:buFont typeface="Arial" panose="020B0604020202020204" pitchFamily="34" charset="0"/>
+              <a:buChar char="•"/>
+            </a:pPr>
+            <a:r>
+              <a:rPr lang="de-AT" sz="1800" b="0" strike="noStrike" spc="-1" dirty="0">
+                <a:latin typeface="Arial"/>
+              </a:rPr>
+              <a:t>Error BDD </a:t>
+            </a:r>
+            <a:r>
+              <a:rPr lang="de-AT" sz="1800" b="0" strike="noStrike" spc="-1" dirty="0" err="1">
+                <a:latin typeface="Arial"/>
+              </a:rPr>
+              <a:t>for</a:t>
+            </a:r>
+            <a:r>
+              <a:rPr lang="de-AT" sz="1800" b="0" strike="noStrike" spc="-1" dirty="0">
+                <a:latin typeface="Arial"/>
+              </a:rPr>
+              <a:t> 8 </a:t>
+            </a:r>
+            <a:r>
+              <a:rPr lang="de-AT" sz="1800" b="0" strike="noStrike" spc="-1" dirty="0" err="1">
+                <a:latin typeface="Arial"/>
+              </a:rPr>
+              <a:t>bit</a:t>
+            </a:r>
+            <a:r>
+              <a:rPr lang="de-AT" sz="1800" b="0" strike="noStrike" spc="-1" dirty="0">
+                <a:latin typeface="Arial"/>
+              </a:rPr>
+              <a:t> </a:t>
+            </a:r>
+            <a:r>
+              <a:rPr lang="de-AT" sz="1800" b="0" strike="noStrike" spc="-1" dirty="0" err="1">
+                <a:latin typeface="Arial"/>
+              </a:rPr>
+              <a:t>adders</a:t>
+            </a:r>
+            <a:endParaRPr lang="de-AT" sz="1800" b="0" strike="noStrike" spc="-1" dirty="0">
+              <a:latin typeface="Arial"/>
+            </a:endParaRPr>
           </a:p>
         </p:txBody>
       </p:sp>
@@ -25776,7 +24259,81 @@
       </p:grpSpPr>
       <p:sp>
         <p:nvSpPr>
-          <p:cNvPr id="154" name="CustomShape 1"/>
+          <p:cNvPr id="248" name="CustomShape 3"/>
+          <p:cNvSpPr/>
+          <p:nvPr/>
+        </p:nvSpPr>
+        <p:spPr>
+          <a:xfrm>
+            <a:off x="4006440" y="6410880"/>
+            <a:ext cx="582480" cy="363960"/>
+          </a:xfrm>
+          <a:prstGeom prst="rect">
+            <a:avLst/>
+          </a:prstGeom>
+          <a:noFill/>
+          <a:ln>
+            <a:noFill/>
+          </a:ln>
+        </p:spPr>
+        <p:style>
+          <a:lnRef idx="0">
+            <a:scrgbClr r="0" g="0" b="0"/>
+          </a:lnRef>
+          <a:fillRef idx="0">
+            <a:scrgbClr r="0" g="0" b="0"/>
+          </a:fillRef>
+          <a:effectRef idx="0">
+            <a:scrgbClr r="0" g="0" b="0"/>
+          </a:effectRef>
+          <a:fontRef idx="minor"/>
+        </p:style>
+        <p:txBody>
+          <a:bodyPr lIns="90000" tIns="45000" rIns="90000" bIns="45000" anchor="ctr">
+            <a:noAutofit/>
+          </a:bodyPr>
+          <a:lstStyle/>
+          <a:p>
+            <a:pPr algn="r">
+              <a:lnSpc>
+                <a:spcPct val="100000"/>
+              </a:lnSpc>
+            </a:pPr>
+            <a:fld id="{529BAE5C-0237-4ABB-9BAC-104434346622}" type="slidenum">
+              <a:rPr lang="zxx" sz="1050" b="0" strike="noStrike" spc="-1">
+                <a:solidFill>
+                  <a:srgbClr val="000000"/>
+                </a:solidFill>
+                <a:latin typeface="Calibri"/>
+                <a:ea typeface="DejaVu Sans"/>
+              </a:rPr>
+              <a:t>26</a:t>
+            </a:fld>
+            <a:r>
+              <a:rPr lang="zxx" sz="1050" b="0" strike="noStrike" spc="-1">
+                <a:solidFill>
+                  <a:srgbClr val="000000"/>
+                </a:solidFill>
+                <a:latin typeface="Calibri"/>
+                <a:ea typeface="DejaVu Sans"/>
+              </a:rPr>
+              <a:t>/</a:t>
+            </a:r>
+            <a:endParaRPr lang="de-AT" sz="1050" b="0" strike="noStrike" spc="-1">
+              <a:latin typeface="Arial"/>
+            </a:endParaRPr>
+          </a:p>
+        </p:txBody>
+      </p:sp>
+      <p:sp>
+        <p:nvSpPr>
+          <p:cNvPr id="5" name="CustomShape 1">
+            <a:extLst>
+              <a:ext uri="{FF2B5EF4-FFF2-40B4-BE49-F238E27FC236}">
+                <a16:creationId xmlns:a16="http://schemas.microsoft.com/office/drawing/2014/main" id="{37C5741D-B088-4970-9247-7E3B65EC82B8}"/>
+              </a:ext>
+            </a:extLst>
+          </p:cNvPr>
           <p:cNvSpPr/>
           <p:nvPr/>
         </p:nvSpPr>
@@ -25817,7 +24374,7 @@
               </a:lnSpc>
             </a:pPr>
             <a:r>
-              <a:rPr lang="zxx" sz="4800" b="0" strike="noStrike" spc="-52">
+              <a:rPr lang="zxx" sz="4800" b="0" strike="noStrike" spc="-52" dirty="0">
                 <a:solidFill>
                   <a:srgbClr val="404040"/>
                 </a:solidFill>
@@ -25825,79 +24382,18 @@
               </a:rPr>
               <a:t>Thank you!</a:t>
             </a:r>
-            <a:endParaRPr lang="zxx" sz="4800" b="0" strike="noStrike" spc="-1">
-              <a:latin typeface="Arial"/>
-            </a:endParaRPr>
-          </a:p>
-        </p:txBody>
-      </p:sp>
-      <p:sp>
-        <p:nvSpPr>
-          <p:cNvPr id="155" name="CustomShape 2"/>
-          <p:cNvSpPr/>
-          <p:nvPr/>
-        </p:nvSpPr>
-        <p:spPr>
-          <a:xfrm>
-            <a:off x="4006440" y="6410880"/>
-            <a:ext cx="582840" cy="364320"/>
-          </a:xfrm>
-          <a:prstGeom prst="rect">
-            <a:avLst/>
-          </a:prstGeom>
-          <a:noFill/>
-          <a:ln>
-            <a:noFill/>
-          </a:ln>
-        </p:spPr>
-        <p:style>
-          <a:lnRef idx="0">
-            <a:scrgbClr r="0" g="0" b="0"/>
-          </a:lnRef>
-          <a:fillRef idx="0">
-            <a:scrgbClr r="0" g="0" b="0"/>
-          </a:fillRef>
-          <a:effectRef idx="0">
-            <a:scrgbClr r="0" g="0" b="0"/>
-          </a:effectRef>
-          <a:fontRef idx="minor"/>
-        </p:style>
-        <p:txBody>
-          <a:bodyPr lIns="90000" tIns="45000" rIns="90000" bIns="45000" anchor="ctr">
-            <a:noAutofit/>
-          </a:bodyPr>
-          <a:lstStyle/>
-          <a:p>
-            <a:pPr algn="r">
-              <a:lnSpc>
-                <a:spcPct val="100000"/>
-              </a:lnSpc>
-            </a:pPr>
-            <a:fld id="{69FF41EE-F4E2-4BD6-9D5C-02DFBA608E94}" type="slidenum">
-              <a:rPr lang="zxx" sz="1050" b="0" strike="noStrike" spc="-1">
-                <a:solidFill>
-                  <a:srgbClr val="000000"/>
-                </a:solidFill>
-                <a:latin typeface="Calibri"/>
-              </a:rPr>
-              <a:t>26</a:t>
-            </a:fld>
-            <a:r>
-              <a:rPr lang="zxx" sz="1050" b="0" strike="noStrike" spc="-1">
-                <a:solidFill>
-                  <a:srgbClr val="000000"/>
-                </a:solidFill>
-                <a:latin typeface="Calibri"/>
-              </a:rPr>
-              <a:t>/</a:t>
-            </a:r>
-            <a:endParaRPr lang="zxx" sz="1050" b="0" strike="noStrike" spc="-1">
+            <a:endParaRPr lang="zxx" sz="4800" b="0" strike="noStrike" spc="-1" dirty="0">
               <a:latin typeface="Arial"/>
             </a:endParaRPr>
           </a:p>
         </p:txBody>
       </p:sp>
     </p:spTree>
+    <p:extLst>
+      <p:ext uri="{BB962C8B-B14F-4D97-AF65-F5344CB8AC3E}">
+        <p14:creationId xmlns:p14="http://schemas.microsoft.com/office/powerpoint/2010/main" val="455168956"/>
+      </p:ext>
+    </p:extLst>
   </p:cSld>
   <p:clrMapOvr>
     <a:masterClrMapping/>
@@ -30744,232 +29240,4 @@
   <a:objectDefaults/>
   <a:extraClrSchemeLst/>
 </a:theme>
-</file>
-
-<file path=ppt/theme/theme4.xml><?xml version="1.0" encoding="utf-8"?>
-<a:theme xmlns:a="http://schemas.openxmlformats.org/drawingml/2006/main" name="Office Theme">
-  <a:themeElements>
-    <a:clrScheme name="Office">
-      <a:dk1>
-        <a:sysClr val="windowText" lastClr="000000"/>
-      </a:dk1>
-      <a:lt1>
-        <a:sysClr val="window" lastClr="FFFFFF"/>
-      </a:lt1>
-      <a:dk2>
-        <a:srgbClr val="344068"/>
-      </a:dk2>
-      <a:lt2>
-        <a:srgbClr val="D9E0E6"/>
-      </a:lt2>
-      <a:accent1>
-        <a:srgbClr val="14496F"/>
-      </a:accent1>
-      <a:accent2>
-        <a:srgbClr val="0E6180"/>
-      </a:accent2>
-      <a:accent3>
-        <a:srgbClr val="1D9399"/>
-      </a:accent3>
-      <a:accent4>
-        <a:srgbClr val="42BA97"/>
-      </a:accent4>
-      <a:accent5>
-        <a:srgbClr val="3E8853"/>
-      </a:accent5>
-      <a:accent6>
-        <a:srgbClr val="37560D"/>
-      </a:accent6>
-      <a:hlink>
-        <a:srgbClr val="00B050"/>
-      </a:hlink>
-      <a:folHlink>
-        <a:srgbClr val="855001"/>
-      </a:folHlink>
-    </a:clrScheme>
-    <a:fontScheme name="Office">
-      <a:majorFont>
-        <a:latin typeface="Arial"/>
-        <a:ea typeface="DejaVu Sans"/>
-        <a:cs typeface="DejaVu Sans"/>
-      </a:majorFont>
-      <a:minorFont>
-        <a:latin typeface="Arial"/>
-        <a:ea typeface="DejaVu Sans"/>
-        <a:cs typeface="DejaVu Sans"/>
-      </a:minorFont>
-    </a:fontScheme>
-    <a:fmtScheme name="Office">
-      <a:fillStyleLst>
-        <a:solidFill>
-          <a:schemeClr val="phClr"/>
-        </a:solidFill>
-        <a:gradFill rotWithShape="1">
-          <a:gsLst>
-            <a:gs pos="0">
-              <a:schemeClr val="phClr">
-                <a:tint val="50000"/>
-                <a:satMod val="300000"/>
-              </a:schemeClr>
-            </a:gs>
-            <a:gs pos="35000">
-              <a:schemeClr val="phClr">
-                <a:tint val="37000"/>
-                <a:satMod val="300000"/>
-              </a:schemeClr>
-            </a:gs>
-            <a:gs pos="100000">
-              <a:schemeClr val="phClr">
-                <a:tint val="15000"/>
-                <a:satMod val="350000"/>
-              </a:schemeClr>
-            </a:gs>
-          </a:gsLst>
-          <a:lin ang="16200000" scaled="1"/>
-        </a:gradFill>
-        <a:gradFill rotWithShape="1">
-          <a:gsLst>
-            <a:gs pos="0">
-              <a:schemeClr val="phClr">
-                <a:shade val="51000"/>
-                <a:satMod val="130000"/>
-              </a:schemeClr>
-            </a:gs>
-            <a:gs pos="80000">
-              <a:schemeClr val="phClr">
-                <a:shade val="93000"/>
-                <a:satMod val="130000"/>
-              </a:schemeClr>
-            </a:gs>
-            <a:gs pos="100000">
-              <a:schemeClr val="phClr">
-                <a:shade val="94000"/>
-                <a:satMod val="135000"/>
-              </a:schemeClr>
-            </a:gs>
-          </a:gsLst>
-          <a:lin ang="16200000" scaled="0"/>
-        </a:gradFill>
-      </a:fillStyleLst>
-      <a:lnStyleLst>
-        <a:ln w="9525" cap="flat" cmpd="sng" algn="ctr">
-          <a:solidFill>
-            <a:schemeClr val="phClr">
-              <a:shade val="95000"/>
-              <a:satMod val="105000"/>
-            </a:schemeClr>
-          </a:solidFill>
-          <a:prstDash val="solid"/>
-          <a:miter/>
-        </a:ln>
-        <a:ln w="25400" cap="flat" cmpd="sng" algn="ctr">
-          <a:solidFill>
-            <a:schemeClr val="phClr"/>
-          </a:solidFill>
-          <a:prstDash val="solid"/>
-          <a:miter/>
-        </a:ln>
-        <a:ln w="38100" cap="flat" cmpd="sng" algn="ctr">
-          <a:solidFill>
-            <a:schemeClr val="phClr"/>
-          </a:solidFill>
-          <a:prstDash val="solid"/>
-          <a:miter/>
-        </a:ln>
-      </a:lnStyleLst>
-      <a:effectStyleLst>
-        <a:effectStyle>
-          <a:effectLst>
-            <a:outerShdw blurRad="40000" dist="20000" dir="5400000" rotWithShape="0">
-              <a:srgbClr val="000000">
-                <a:alpha val="38000"/>
-              </a:srgbClr>
-            </a:outerShdw>
-          </a:effectLst>
-        </a:effectStyle>
-        <a:effectStyle>
-          <a:effectLst>
-            <a:outerShdw blurRad="40000" dist="23000" dir="5400000" rotWithShape="0">
-              <a:srgbClr val="000000">
-                <a:alpha val="35000"/>
-              </a:srgbClr>
-            </a:outerShdw>
-          </a:effectLst>
-        </a:effectStyle>
-        <a:effectStyle>
-          <a:effectLst>
-            <a:outerShdw blurRad="40000" dist="23000" dir="5400000" rotWithShape="0">
-              <a:srgbClr val="000000">
-                <a:alpha val="35000"/>
-              </a:srgbClr>
-            </a:outerShdw>
-          </a:effectLst>
-          <a:scene3d>
-            <a:camera prst="orthographicFront">
-              <a:rot lat="0" lon="0" rev="0"/>
-            </a:camera>
-            <a:lightRig rig="threePt" dir="t">
-              <a:rot lat="0" lon="0" rev="1200000"/>
-            </a:lightRig>
-          </a:scene3d>
-          <a:sp3d>
-            <a:bevelT w="63500" h="25400"/>
-          </a:sp3d>
-        </a:effectStyle>
-      </a:effectStyleLst>
-      <a:bgFillStyleLst>
-        <a:solidFill>
-          <a:schemeClr val="phClr"/>
-        </a:solidFill>
-        <a:gradFill rotWithShape="1">
-          <a:gsLst>
-            <a:gs pos="0">
-              <a:schemeClr val="phClr">
-                <a:tint val="40000"/>
-                <a:satMod val="350000"/>
-              </a:schemeClr>
-            </a:gs>
-            <a:gs pos="40000">
-              <a:schemeClr val="phClr">
-                <a:tint val="45000"/>
-                <a:shade val="99000"/>
-                <a:satMod val="350000"/>
-              </a:schemeClr>
-            </a:gs>
-            <a:gs pos="100000">
-              <a:schemeClr val="phClr">
-                <a:shade val="20000"/>
-                <a:satMod val="255000"/>
-              </a:schemeClr>
-            </a:gs>
-          </a:gsLst>
-          <a:path path="circle">
-            <a:fillToRect l="50000" t="-80000" r="50000" b="180000"/>
-          </a:path>
-        </a:gradFill>
-        <a:gradFill rotWithShape="1">
-          <a:gsLst>
-            <a:gs pos="0">
-              <a:schemeClr val="phClr">
-                <a:tint val="80000"/>
-                <a:satMod val="300000"/>
-              </a:schemeClr>
-            </a:gs>
-            <a:gs pos="100000">
-              <a:schemeClr val="phClr">
-                <a:shade val="30000"/>
-                <a:satMod val="200000"/>
-              </a:schemeClr>
-            </a:gs>
-          </a:gsLst>
-          <a:path path="circle">
-            <a:fillToRect l="50000" t="50000" r="50000" b="50000"/>
-          </a:path>
-        </a:gradFill>
-      </a:bgFillStyleLst>
-    </a:fmtScheme>
-  </a:themeElements>
-  <a:objectDefaults/>
-  <a:extraClrSchemeLst/>
-</a:theme>
 </file>
</xml_diff>